<commit_message>
presentation updated. useful links and how to contact me added
</commit_message>
<xml_diff>
--- a/docs/Build High Performance Services With gRPC and .NET 5.pptx
+++ b/docs/Build High Performance Services With gRPC and .NET 5.pptx
@@ -18,6 +18,8 @@
     <p:sldId id="266" r:id="rId12"/>
     <p:sldId id="267" r:id="rId13"/>
     <p:sldId id="271" r:id="rId14"/>
+    <p:sldId id="272" r:id="rId15"/>
+    <p:sldId id="273" r:id="rId16"/>
   </p:sldIdLst>
   <p:sldSz cx="12192000" cy="6858000"/>
   <p:notesSz cx="6858000" cy="9144000"/>
@@ -5721,7 +5723,7 @@
           <a:p>
             <a:fld id="{1036C169-70BF-412B-BAB2-4313ADDFA40A}" type="datetimeFigureOut">
               <a:rPr lang="fa-IR" smtClean="0"/>
-              <a:t>16/12/1442</a:t>
+              <a:t>17/12/1442</a:t>
             </a:fld>
             <a:endParaRPr lang="fa-IR"/>
           </a:p>
@@ -5983,7 +5985,7 @@
           <a:p>
             <a:fld id="{1036C169-70BF-412B-BAB2-4313ADDFA40A}" type="datetimeFigureOut">
               <a:rPr lang="fa-IR" smtClean="0"/>
-              <a:t>16/12/1442</a:t>
+              <a:t>17/12/1442</a:t>
             </a:fld>
             <a:endParaRPr lang="fa-IR"/>
           </a:p>
@@ -6218,7 +6220,7 @@
           <a:p>
             <a:fld id="{1036C169-70BF-412B-BAB2-4313ADDFA40A}" type="datetimeFigureOut">
               <a:rPr lang="fa-IR" smtClean="0"/>
-              <a:t>16/12/1442</a:t>
+              <a:t>17/12/1442</a:t>
             </a:fld>
             <a:endParaRPr lang="fa-IR"/>
           </a:p>
@@ -6458,7 +6460,7 @@
           <a:p>
             <a:fld id="{1036C169-70BF-412B-BAB2-4313ADDFA40A}" type="datetimeFigureOut">
               <a:rPr lang="fa-IR" smtClean="0"/>
-              <a:t>16/12/1442</a:t>
+              <a:t>17/12/1442</a:t>
             </a:fld>
             <a:endParaRPr lang="fa-IR"/>
           </a:p>
@@ -6765,7 +6767,7 @@
           <a:p>
             <a:fld id="{1036C169-70BF-412B-BAB2-4313ADDFA40A}" type="datetimeFigureOut">
               <a:rPr lang="fa-IR" smtClean="0"/>
-              <a:t>16/12/1442</a:t>
+              <a:t>17/12/1442</a:t>
             </a:fld>
             <a:endParaRPr lang="fa-IR"/>
           </a:p>
@@ -7067,7 +7069,7 @@
           <a:p>
             <a:fld id="{1036C169-70BF-412B-BAB2-4313ADDFA40A}" type="datetimeFigureOut">
               <a:rPr lang="fa-IR" smtClean="0"/>
-              <a:t>16/12/1442</a:t>
+              <a:t>17/12/1442</a:t>
             </a:fld>
             <a:endParaRPr lang="fa-IR"/>
           </a:p>
@@ -7489,7 +7491,7 @@
           <a:p>
             <a:fld id="{1036C169-70BF-412B-BAB2-4313ADDFA40A}" type="datetimeFigureOut">
               <a:rPr lang="fa-IR" smtClean="0"/>
-              <a:t>16/12/1442</a:t>
+              <a:t>17/12/1442</a:t>
             </a:fld>
             <a:endParaRPr lang="fa-IR"/>
           </a:p>
@@ -7584,7 +7586,7 @@
           <a:p>
             <a:fld id="{1036C169-70BF-412B-BAB2-4313ADDFA40A}" type="datetimeFigureOut">
               <a:rPr lang="fa-IR" smtClean="0"/>
-              <a:t>16/12/1442</a:t>
+              <a:t>17/12/1442</a:t>
             </a:fld>
             <a:endParaRPr lang="fa-IR"/>
           </a:p>
@@ -7746,7 +7748,7 @@
           <a:p>
             <a:fld id="{1036C169-70BF-412B-BAB2-4313ADDFA40A}" type="datetimeFigureOut">
               <a:rPr lang="fa-IR" smtClean="0"/>
-              <a:t>16/12/1442</a:t>
+              <a:t>17/12/1442</a:t>
             </a:fld>
             <a:endParaRPr lang="fa-IR"/>
           </a:p>
@@ -8124,7 +8126,7 @@
           <a:p>
             <a:fld id="{1036C169-70BF-412B-BAB2-4313ADDFA40A}" type="datetimeFigureOut">
               <a:rPr lang="fa-IR" smtClean="0"/>
-              <a:t>16/12/1442</a:t>
+              <a:t>17/12/1442</a:t>
             </a:fld>
             <a:endParaRPr lang="fa-IR"/>
           </a:p>
@@ -8413,7 +8415,7 @@
           <a:p>
             <a:fld id="{1036C169-70BF-412B-BAB2-4313ADDFA40A}" type="datetimeFigureOut">
               <a:rPr lang="fa-IR" smtClean="0"/>
-              <a:t>16/12/1442</a:t>
+              <a:t>17/12/1442</a:t>
             </a:fld>
             <a:endParaRPr lang="fa-IR"/>
           </a:p>
@@ -8638,7 +8640,7 @@
           <a:p>
             <a:fld id="{1036C169-70BF-412B-BAB2-4313ADDFA40A}" type="datetimeFigureOut">
               <a:rPr lang="fa-IR" smtClean="0"/>
-              <a:t>16/12/1442</a:t>
+              <a:t>17/12/1442</a:t>
             </a:fld>
             <a:endParaRPr lang="fa-IR"/>
           </a:p>
@@ -9477,7 +9479,7 @@
           <a:p>
             <a:r>
               <a:rPr lang="en-US" b="1" dirty="0">
-                <a:latin typeface="Cody" pitchFamily="2" charset="0"/>
+                <a:latin typeface="Comic Sans MS" panose="030F0702030302020204" pitchFamily="66" charset="0"/>
                 <a:ea typeface="+mn-ea"/>
                 <a:cs typeface="MV Boli" panose="02000500030200090000" pitchFamily="2" charset="0"/>
               </a:rPr>
@@ -10157,7 +10159,7 @@
           <a:p>
             <a:r>
               <a:rPr lang="en-US" b="1" dirty="0">
-                <a:latin typeface="Cody" pitchFamily="2" charset="0"/>
+                <a:latin typeface="Comic Sans MS" panose="030F0702030302020204" pitchFamily="66" charset="0"/>
                 <a:ea typeface="+mn-ea"/>
                 <a:cs typeface="MV Boli" panose="02000500030200090000" pitchFamily="2" charset="0"/>
               </a:rPr>
@@ -10165,7 +10167,7 @@
             </a:r>
             <a:r>
               <a:rPr lang="en-US" b="1" dirty="0" err="1">
-                <a:latin typeface="Cody" pitchFamily="2" charset="0"/>
+                <a:latin typeface="Comic Sans MS" panose="030F0702030302020204" pitchFamily="66" charset="0"/>
                 <a:ea typeface="+mn-ea"/>
                 <a:cs typeface="MV Boli" panose="02000500030200090000" pitchFamily="2" charset="0"/>
               </a:rPr>
@@ -10173,7 +10175,7 @@
             </a:r>
             <a:r>
               <a:rPr lang="en-US" b="1" dirty="0">
-                <a:latin typeface="Cody" pitchFamily="2" charset="0"/>
+                <a:latin typeface="Comic Sans MS" panose="030F0702030302020204" pitchFamily="66" charset="0"/>
                 <a:ea typeface="+mn-ea"/>
                 <a:cs typeface="MV Boli" panose="02000500030200090000" pitchFamily="2" charset="0"/>
               </a:rPr>
@@ -10261,6 +10263,16 @@
               </a:lnSpc>
             </a:pPr>
             <a:r>
+              <a:rPr lang="en-US" sz="2000" b="1">
+                <a:solidFill>
+                  <a:srgbClr val="512CD4"/>
+                </a:solidFill>
+                <a:latin typeface="MV Boli" panose="02000500030200090000" pitchFamily="2" charset="0"/>
+                <a:cs typeface="MV Boli" panose="02000500030200090000" pitchFamily="2" charset="0"/>
+              </a:rPr>
+              <a:t>Detailed exception </a:t>
+            </a:r>
+            <a:r>
               <a:rPr lang="en-US" sz="2000" b="1" dirty="0">
                 <a:solidFill>
                   <a:srgbClr val="512CD4"/>
@@ -10268,7 +10280,7 @@
                 <a:latin typeface="MV Boli" panose="02000500030200090000" pitchFamily="2" charset="0"/>
                 <a:cs typeface="MV Boli" panose="02000500030200090000" pitchFamily="2" charset="0"/>
               </a:rPr>
-              <a:t>Exception messages shouldn't be exposed to the client in production apps.</a:t>
+              <a:t>messages shouldn't be exposed to the client in production apps.</a:t>
             </a:r>
           </a:p>
           <a:p>
@@ -11376,7 +11388,7 @@
           <a:p>
             <a:r>
               <a:rPr lang="en-US" b="1" dirty="0">
-                <a:latin typeface="Cody" pitchFamily="2" charset="0"/>
+                <a:latin typeface="Comic Sans MS" panose="030F0702030302020204" pitchFamily="66" charset="0"/>
                 <a:ea typeface="+mn-ea"/>
                 <a:cs typeface="MV Boli" panose="02000500030200090000" pitchFamily="2" charset="0"/>
               </a:rPr>
@@ -11491,16 +11503,6 @@
               </a:lnSpc>
             </a:pPr>
             <a:r>
-              <a:rPr lang="en-US" sz="2000" b="1">
-                <a:solidFill>
-                  <a:srgbClr val="512CD4"/>
-                </a:solidFill>
-                <a:latin typeface="MV Boli" panose="02000500030200090000" pitchFamily="2" charset="0"/>
-                <a:cs typeface="MV Boli" panose="02000500030200090000" pitchFamily="2" charset="0"/>
-              </a:rPr>
-              <a:t>Retries </a:t>
-            </a:r>
-            <a:r>
               <a:rPr lang="en-US" sz="2000" b="1" dirty="0">
                 <a:solidFill>
                   <a:srgbClr val="512CD4"/>
@@ -11508,7 +11510,7 @@
                 <a:latin typeface="MV Boli" panose="02000500030200090000" pitchFamily="2" charset="0"/>
                 <a:cs typeface="MV Boli" panose="02000500030200090000" pitchFamily="2" charset="0"/>
               </a:rPr>
-              <a:t>strategies:</a:t>
+              <a:t>Retries strategies:</a:t>
             </a:r>
           </a:p>
           <a:p>
@@ -12611,7 +12613,7 @@
           <a:p>
             <a:r>
               <a:rPr lang="en-US" b="1" dirty="0">
-                <a:latin typeface="Cody" pitchFamily="2" charset="0"/>
+                <a:latin typeface="Comic Sans MS" panose="030F0702030302020204" pitchFamily="66" charset="0"/>
                 <a:ea typeface="+mn-ea"/>
                 <a:cs typeface="MV Boli" panose="02000500030200090000" pitchFamily="2" charset="0"/>
               </a:rPr>
@@ -12619,7 +12621,7 @@
             </a:r>
             <a:r>
               <a:rPr lang="en-US" b="1" dirty="0" err="1">
-                <a:latin typeface="Cody" pitchFamily="2" charset="0"/>
+                <a:latin typeface="Comic Sans MS" panose="030F0702030302020204" pitchFamily="66" charset="0"/>
                 <a:ea typeface="+mn-ea"/>
                 <a:cs typeface="MV Boli" panose="02000500030200090000" pitchFamily="2" charset="0"/>
               </a:rPr>
@@ -12627,7 +12629,7 @@
             </a:r>
             <a:r>
               <a:rPr lang="en-US" b="1" dirty="0">
-                <a:latin typeface="Cody" pitchFamily="2" charset="0"/>
+                <a:latin typeface="Comic Sans MS" panose="030F0702030302020204" pitchFamily="66" charset="0"/>
                 <a:ea typeface="+mn-ea"/>
                 <a:cs typeface="MV Boli" panose="02000500030200090000" pitchFamily="2" charset="0"/>
               </a:rPr>
@@ -12635,14 +12637,14 @@
             </a:r>
             <a:r>
               <a:rPr lang="en-US" b="1" dirty="0" err="1">
-                <a:latin typeface="Cody" pitchFamily="2" charset="0"/>
+                <a:latin typeface="Comic Sans MS" panose="030F0702030302020204" pitchFamily="66" charset="0"/>
                 <a:ea typeface="+mn-ea"/>
                 <a:cs typeface="MV Boli" panose="02000500030200090000" pitchFamily="2" charset="0"/>
               </a:rPr>
               <a:t>gRPCurl</a:t>
             </a:r>
             <a:endParaRPr lang="en-US" b="1" dirty="0">
-              <a:latin typeface="Cody" pitchFamily="2" charset="0"/>
+              <a:latin typeface="Comic Sans MS" panose="030F0702030302020204" pitchFamily="66" charset="0"/>
               <a:ea typeface="+mn-ea"/>
               <a:cs typeface="MV Boli" panose="02000500030200090000" pitchFamily="2" charset="0"/>
             </a:endParaRPr>
@@ -13860,6 +13862,2261 @@
 </p:sld>
 </file>
 
+<file path=ppt/slides/slide14.xml><?xml version="1.0" encoding="utf-8"?>
+<p:sld xmlns:a="http://schemas.openxmlformats.org/drawingml/2006/main" xmlns:r="http://schemas.openxmlformats.org/officeDocument/2006/relationships" xmlns:p="http://schemas.openxmlformats.org/presentationml/2006/main">
+  <p:cSld>
+    <p:spTree>
+      <p:nvGrpSpPr>
+        <p:cNvPr id="1" name=""/>
+        <p:cNvGrpSpPr/>
+        <p:nvPr/>
+      </p:nvGrpSpPr>
+      <p:grpSpPr>
+        <a:xfrm>
+          <a:off x="0" y="0"/>
+          <a:ext cx="0" cy="0"/>
+          <a:chOff x="0" y="0"/>
+          <a:chExt cx="0" cy="0"/>
+        </a:xfrm>
+      </p:grpSpPr>
+      <p:sp>
+        <p:nvSpPr>
+          <p:cNvPr id="2" name="Title 1"/>
+          <p:cNvSpPr>
+            <a:spLocks noGrp="1"/>
+          </p:cNvSpPr>
+          <p:nvPr>
+            <p:ph type="title"/>
+          </p:nvPr>
+        </p:nvSpPr>
+        <p:spPr/>
+        <p:txBody>
+          <a:bodyPr>
+            <a:normAutofit/>
+          </a:bodyPr>
+          <a:lstStyle/>
+          <a:p>
+            <a:r>
+              <a:rPr lang="en-US" b="1" dirty="0">
+                <a:latin typeface="Comic Sans MS" panose="030F0702030302020204" pitchFamily="66" charset="0"/>
+                <a:ea typeface="+mn-ea"/>
+                <a:cs typeface="MV Boli" panose="02000500030200090000" pitchFamily="2" charset="0"/>
+              </a:rPr>
+              <a:t>Some useful links</a:t>
+            </a:r>
+          </a:p>
+        </p:txBody>
+      </p:sp>
+      <p:sp>
+        <p:nvSpPr>
+          <p:cNvPr id="3" name="Content Placeholder 2"/>
+          <p:cNvSpPr>
+            <a:spLocks noGrp="1"/>
+          </p:cNvSpPr>
+          <p:nvPr>
+            <p:ph idx="1"/>
+          </p:nvPr>
+        </p:nvSpPr>
+        <p:spPr>
+          <a:xfrm>
+            <a:off x="408371" y="1979721"/>
+            <a:ext cx="11478829" cy="4816134"/>
+          </a:xfrm>
+        </p:spPr>
+        <p:txBody>
+          <a:bodyPr anchor="t">
+            <a:noAutofit/>
+          </a:bodyPr>
+          <a:lstStyle/>
+          <a:p>
+            <a:pPr algn="l" rtl="0">
+              <a:lnSpc>
+                <a:spcPct val="160000"/>
+              </a:lnSpc>
+            </a:pPr>
+            <a:r>
+              <a:rPr lang="en-US" sz="2400" b="1" dirty="0" err="1">
+                <a:solidFill>
+                  <a:srgbClr val="512CD4"/>
+                </a:solidFill>
+                <a:latin typeface="MV Boli" panose="02000500030200090000" pitchFamily="2" charset="0"/>
+                <a:cs typeface="MV Boli" panose="02000500030200090000" pitchFamily="2" charset="0"/>
+                <a:hlinkClick r:id="rId2">
+                  <a:extLst>
+                    <a:ext uri="{A12FA001-AC4F-418D-AE19-62706E023703}">
+                      <ahyp:hlinkClr xmlns:ahyp="http://schemas.microsoft.com/office/drawing/2018/hyperlinkcolor" val="tx"/>
+                    </a:ext>
+                  </a:extLst>
+                </a:hlinkClick>
+              </a:rPr>
+              <a:t>gRPC</a:t>
+            </a:r>
+            <a:r>
+              <a:rPr lang="en-US" sz="2400" b="1" dirty="0">
+                <a:solidFill>
+                  <a:srgbClr val="512CD4"/>
+                </a:solidFill>
+                <a:latin typeface="MV Boli" panose="02000500030200090000" pitchFamily="2" charset="0"/>
+                <a:cs typeface="MV Boli" panose="02000500030200090000" pitchFamily="2" charset="0"/>
+                <a:hlinkClick r:id="rId2">
+                  <a:extLst>
+                    <a:ext uri="{A12FA001-AC4F-418D-AE19-62706E023703}">
+                      <ahyp:hlinkClr xmlns:ahyp="http://schemas.microsoft.com/office/drawing/2018/hyperlinkcolor" val="tx"/>
+                    </a:ext>
+                  </a:extLst>
+                </a:hlinkClick>
+              </a:rPr>
+              <a:t> Documentation | grpc.io</a:t>
+            </a:r>
+            <a:endParaRPr lang="en-US" sz="2400" b="1" dirty="0">
+              <a:solidFill>
+                <a:srgbClr val="512CD4"/>
+              </a:solidFill>
+              <a:latin typeface="MV Boli" panose="02000500030200090000" pitchFamily="2" charset="0"/>
+              <a:cs typeface="MV Boli" panose="02000500030200090000" pitchFamily="2" charset="0"/>
+            </a:endParaRPr>
+          </a:p>
+          <a:p>
+            <a:pPr algn="l" rtl="0">
+              <a:lnSpc>
+                <a:spcPct val="160000"/>
+              </a:lnSpc>
+            </a:pPr>
+            <a:r>
+              <a:rPr lang="en-US" sz="2400" b="1" dirty="0" err="1">
+                <a:solidFill>
+                  <a:srgbClr val="512CD4"/>
+                </a:solidFill>
+                <a:latin typeface="MV Boli" panose="02000500030200090000" pitchFamily="2" charset="0"/>
+                <a:cs typeface="MV Boli" panose="02000500030200090000" pitchFamily="2" charset="0"/>
+                <a:hlinkClick r:id="rId3">
+                  <a:extLst>
+                    <a:ext uri="{A12FA001-AC4F-418D-AE19-62706E023703}">
+                      <ahyp:hlinkClr xmlns:ahyp="http://schemas.microsoft.com/office/drawing/2018/hyperlinkcolor" val="tx"/>
+                    </a:ext>
+                  </a:extLst>
+                </a:hlinkClick>
+              </a:rPr>
+              <a:t>gRPC</a:t>
+            </a:r>
+            <a:r>
+              <a:rPr lang="en-US" sz="2400" b="1" dirty="0">
+                <a:solidFill>
+                  <a:srgbClr val="512CD4"/>
+                </a:solidFill>
+                <a:latin typeface="MV Boli" panose="02000500030200090000" pitchFamily="2" charset="0"/>
+                <a:cs typeface="MV Boli" panose="02000500030200090000" pitchFamily="2" charset="0"/>
+                <a:hlinkClick r:id="rId3">
+                  <a:extLst>
+                    <a:ext uri="{A12FA001-AC4F-418D-AE19-62706E023703}">
+                      <ahyp:hlinkClr xmlns:ahyp="http://schemas.microsoft.com/office/drawing/2018/hyperlinkcolor" val="tx"/>
+                    </a:ext>
+                  </a:extLst>
+                </a:hlinkClick>
+              </a:rPr>
+              <a:t>-Gateway | grpc-ecosystem.github.io</a:t>
+            </a:r>
+            <a:endParaRPr lang="en-US" sz="2400" b="1" dirty="0">
+              <a:solidFill>
+                <a:srgbClr val="512CD4"/>
+              </a:solidFill>
+              <a:latin typeface="MV Boli" panose="02000500030200090000" pitchFamily="2" charset="0"/>
+              <a:cs typeface="MV Boli" panose="02000500030200090000" pitchFamily="2" charset="0"/>
+            </a:endParaRPr>
+          </a:p>
+          <a:p>
+            <a:pPr algn="l" rtl="0">
+              <a:lnSpc>
+                <a:spcPct val="160000"/>
+              </a:lnSpc>
+            </a:pPr>
+            <a:r>
+              <a:rPr lang="en-US" sz="2400" b="1" dirty="0">
+                <a:solidFill>
+                  <a:srgbClr val="512CD4"/>
+                </a:solidFill>
+                <a:latin typeface="MV Boli" panose="02000500030200090000" pitchFamily="2" charset="0"/>
+                <a:cs typeface="MV Boli" panose="02000500030200090000" pitchFamily="2" charset="0"/>
+                <a:hlinkClick r:id="rId4">
+                  <a:extLst>
+                    <a:ext uri="{A12FA001-AC4F-418D-AE19-62706E023703}">
+                      <ahyp:hlinkClr xmlns:ahyp="http://schemas.microsoft.com/office/drawing/2018/hyperlinkcolor" val="tx"/>
+                    </a:ext>
+                  </a:extLst>
+                </a:hlinkClick>
+              </a:rPr>
+              <a:t>Introduction to </a:t>
+            </a:r>
+            <a:r>
+              <a:rPr lang="en-US" sz="2400" b="1" dirty="0" err="1">
+                <a:solidFill>
+                  <a:srgbClr val="512CD4"/>
+                </a:solidFill>
+                <a:latin typeface="MV Boli" panose="02000500030200090000" pitchFamily="2" charset="0"/>
+                <a:cs typeface="MV Boli" panose="02000500030200090000" pitchFamily="2" charset="0"/>
+                <a:hlinkClick r:id="rId4">
+                  <a:extLst>
+                    <a:ext uri="{A12FA001-AC4F-418D-AE19-62706E023703}">
+                      <ahyp:hlinkClr xmlns:ahyp="http://schemas.microsoft.com/office/drawing/2018/hyperlinkcolor" val="tx"/>
+                    </a:ext>
+                  </a:extLst>
+                </a:hlinkClick>
+              </a:rPr>
+              <a:t>gRPC</a:t>
+            </a:r>
+            <a:r>
+              <a:rPr lang="en-US" sz="2400" b="1" dirty="0">
+                <a:solidFill>
+                  <a:srgbClr val="512CD4"/>
+                </a:solidFill>
+                <a:latin typeface="MV Boli" panose="02000500030200090000" pitchFamily="2" charset="0"/>
+                <a:cs typeface="MV Boli" panose="02000500030200090000" pitchFamily="2" charset="0"/>
+                <a:hlinkClick r:id="rId4">
+                  <a:extLst>
+                    <a:ext uri="{A12FA001-AC4F-418D-AE19-62706E023703}">
+                      <ahyp:hlinkClr xmlns:ahyp="http://schemas.microsoft.com/office/drawing/2018/hyperlinkcolor" val="tx"/>
+                    </a:ext>
+                  </a:extLst>
+                </a:hlinkClick>
+              </a:rPr>
+              <a:t> on .NET | Microsoft Docs</a:t>
+            </a:r>
+            <a:endParaRPr lang="en-US" sz="2400" b="1" dirty="0">
+              <a:solidFill>
+                <a:srgbClr val="512CD4"/>
+              </a:solidFill>
+              <a:latin typeface="MV Boli" panose="02000500030200090000" pitchFamily="2" charset="0"/>
+              <a:cs typeface="MV Boli" panose="02000500030200090000" pitchFamily="2" charset="0"/>
+            </a:endParaRPr>
+          </a:p>
+          <a:p>
+            <a:pPr algn="l" rtl="0">
+              <a:lnSpc>
+                <a:spcPct val="160000"/>
+              </a:lnSpc>
+            </a:pPr>
+            <a:r>
+              <a:rPr lang="en-US" sz="2400" b="1" dirty="0" err="1">
+                <a:solidFill>
+                  <a:srgbClr val="512CD4"/>
+                </a:solidFill>
+                <a:latin typeface="MV Boli" panose="02000500030200090000" pitchFamily="2" charset="0"/>
+                <a:cs typeface="MV Boli" panose="02000500030200090000" pitchFamily="2" charset="0"/>
+                <a:hlinkClick r:id="rId5">
+                  <a:extLst>
+                    <a:ext uri="{A12FA001-AC4F-418D-AE19-62706E023703}">
+                      <ahyp:hlinkClr xmlns:ahyp="http://schemas.microsoft.com/office/drawing/2018/hyperlinkcolor" val="tx"/>
+                    </a:ext>
+                  </a:extLst>
+                </a:hlinkClick>
+              </a:rPr>
+              <a:t>gRPC</a:t>
+            </a:r>
+            <a:r>
+              <a:rPr lang="en-US" sz="2400" b="1" dirty="0">
+                <a:solidFill>
+                  <a:srgbClr val="512CD4"/>
+                </a:solidFill>
+                <a:latin typeface="MV Boli" panose="02000500030200090000" pitchFamily="2" charset="0"/>
+                <a:cs typeface="MV Boli" panose="02000500030200090000" pitchFamily="2" charset="0"/>
+                <a:hlinkClick r:id="rId5">
+                  <a:extLst>
+                    <a:ext uri="{A12FA001-AC4F-418D-AE19-62706E023703}">
+                      <ahyp:hlinkClr xmlns:ahyp="http://schemas.microsoft.com/office/drawing/2018/hyperlinkcolor" val="tx"/>
+                    </a:ext>
+                  </a:extLst>
+                </a:hlinkClick>
+              </a:rPr>
+              <a:t> for .NET | github.com</a:t>
+            </a:r>
+            <a:endParaRPr lang="en-US" sz="2400" b="1" dirty="0">
+              <a:solidFill>
+                <a:srgbClr val="512CD4"/>
+              </a:solidFill>
+              <a:latin typeface="MV Boli" panose="02000500030200090000" pitchFamily="2" charset="0"/>
+              <a:cs typeface="MV Boli" panose="02000500030200090000" pitchFamily="2" charset="0"/>
+            </a:endParaRPr>
+          </a:p>
+          <a:p>
+            <a:pPr algn="l" rtl="0">
+              <a:lnSpc>
+                <a:spcPct val="160000"/>
+              </a:lnSpc>
+            </a:pPr>
+            <a:r>
+              <a:rPr lang="en-US" sz="2400" b="1" dirty="0">
+                <a:solidFill>
+                  <a:srgbClr val="512CD4"/>
+                </a:solidFill>
+                <a:latin typeface="MV Boli" panose="02000500030200090000" pitchFamily="2" charset="0"/>
+                <a:cs typeface="MV Boli" panose="02000500030200090000" pitchFamily="2" charset="0"/>
+                <a:hlinkClick r:id="rId6">
+                  <a:extLst>
+                    <a:ext uri="{A12FA001-AC4F-418D-AE19-62706E023703}">
+                      <ahyp:hlinkClr xmlns:ahyp="http://schemas.microsoft.com/office/drawing/2018/hyperlinkcolor" val="tx"/>
+                    </a:ext>
+                  </a:extLst>
+                </a:hlinkClick>
+              </a:rPr>
+              <a:t>Logging </a:t>
+            </a:r>
+            <a:r>
+              <a:rPr lang="en-US" sz="2400" b="1" dirty="0" err="1">
+                <a:solidFill>
+                  <a:srgbClr val="512CD4"/>
+                </a:solidFill>
+                <a:latin typeface="MV Boli" panose="02000500030200090000" pitchFamily="2" charset="0"/>
+                <a:cs typeface="MV Boli" panose="02000500030200090000" pitchFamily="2" charset="0"/>
+                <a:hlinkClick r:id="rId6">
+                  <a:extLst>
+                    <a:ext uri="{A12FA001-AC4F-418D-AE19-62706E023703}">
+                      <ahyp:hlinkClr xmlns:ahyp="http://schemas.microsoft.com/office/drawing/2018/hyperlinkcolor" val="tx"/>
+                    </a:ext>
+                  </a:extLst>
+                </a:hlinkClick>
+              </a:rPr>
+              <a:t>gRPC</a:t>
+            </a:r>
+            <a:r>
+              <a:rPr lang="en-US" sz="2400" b="1" dirty="0">
+                <a:solidFill>
+                  <a:srgbClr val="512CD4"/>
+                </a:solidFill>
+                <a:latin typeface="MV Boli" panose="02000500030200090000" pitchFamily="2" charset="0"/>
+                <a:cs typeface="MV Boli" panose="02000500030200090000" pitchFamily="2" charset="0"/>
+                <a:hlinkClick r:id="rId6">
+                  <a:extLst>
+                    <a:ext uri="{A12FA001-AC4F-418D-AE19-62706E023703}">
+                      <ahyp:hlinkClr xmlns:ahyp="http://schemas.microsoft.com/office/drawing/2018/hyperlinkcolor" val="tx"/>
+                    </a:ext>
+                  </a:extLst>
+                </a:hlinkClick>
+              </a:rPr>
+              <a:t> requests using </a:t>
+            </a:r>
+            <a:r>
+              <a:rPr lang="en-US" sz="2400" b="1" dirty="0" err="1">
+                <a:solidFill>
+                  <a:srgbClr val="512CD4"/>
+                </a:solidFill>
+                <a:latin typeface="MV Boli" panose="02000500030200090000" pitchFamily="2" charset="0"/>
+                <a:cs typeface="MV Boli" panose="02000500030200090000" pitchFamily="2" charset="0"/>
+                <a:hlinkClick r:id="rId6">
+                  <a:extLst>
+                    <a:ext uri="{A12FA001-AC4F-418D-AE19-62706E023703}">
+                      <ahyp:hlinkClr xmlns:ahyp="http://schemas.microsoft.com/office/drawing/2018/hyperlinkcolor" val="tx"/>
+                    </a:ext>
+                  </a:extLst>
+                </a:hlinkClick>
+              </a:rPr>
+              <a:t>Serilog</a:t>
+            </a:r>
+            <a:r>
+              <a:rPr lang="en-US" sz="2400" b="1" dirty="0">
+                <a:solidFill>
+                  <a:srgbClr val="512CD4"/>
+                </a:solidFill>
+                <a:latin typeface="MV Boli" panose="02000500030200090000" pitchFamily="2" charset="0"/>
+                <a:cs typeface="MV Boli" panose="02000500030200090000" pitchFamily="2" charset="0"/>
+                <a:hlinkClick r:id="rId6">
+                  <a:extLst>
+                    <a:ext uri="{A12FA001-AC4F-418D-AE19-62706E023703}">
+                      <ahyp:hlinkClr xmlns:ahyp="http://schemas.microsoft.com/office/drawing/2018/hyperlinkcolor" val="tx"/>
+                    </a:ext>
+                  </a:extLst>
+                </a:hlinkClick>
+              </a:rPr>
+              <a:t> | gsferreira.com</a:t>
+            </a:r>
+            <a:endParaRPr lang="en-US" sz="2400" b="1" dirty="0">
+              <a:solidFill>
+                <a:srgbClr val="512CD4"/>
+              </a:solidFill>
+              <a:latin typeface="MV Boli" panose="02000500030200090000" pitchFamily="2" charset="0"/>
+              <a:cs typeface="MV Boli" panose="02000500030200090000" pitchFamily="2" charset="0"/>
+            </a:endParaRPr>
+          </a:p>
+          <a:p>
+            <a:pPr algn="l" rtl="0">
+              <a:lnSpc>
+                <a:spcPct val="160000"/>
+              </a:lnSpc>
+            </a:pPr>
+            <a:r>
+              <a:rPr lang="en-US" sz="2400" b="1" dirty="0">
+                <a:solidFill>
+                  <a:srgbClr val="512CD4"/>
+                </a:solidFill>
+                <a:latin typeface="MV Boli" panose="02000500030200090000" pitchFamily="2" charset="0"/>
+                <a:cs typeface="MV Boli" panose="02000500030200090000" pitchFamily="2" charset="0"/>
+                <a:hlinkClick r:id="rId7">
+                  <a:extLst>
+                    <a:ext uri="{A12FA001-AC4F-418D-AE19-62706E023703}">
+                      <ahyp:hlinkClr xmlns:ahyp="http://schemas.microsoft.com/office/drawing/2018/hyperlinkcolor" val="tx"/>
+                    </a:ext>
+                  </a:extLst>
+                </a:hlinkClick>
+              </a:rPr>
+              <a:t>Getting Started with </a:t>
+            </a:r>
+            <a:r>
+              <a:rPr lang="en-US" sz="2400" b="1" dirty="0" err="1">
+                <a:solidFill>
+                  <a:srgbClr val="512CD4"/>
+                </a:solidFill>
+                <a:latin typeface="MV Boli" panose="02000500030200090000" pitchFamily="2" charset="0"/>
+                <a:cs typeface="MV Boli" panose="02000500030200090000" pitchFamily="2" charset="0"/>
+                <a:hlinkClick r:id="rId7">
+                  <a:extLst>
+                    <a:ext uri="{A12FA001-AC4F-418D-AE19-62706E023703}">
+                      <ahyp:hlinkClr xmlns:ahyp="http://schemas.microsoft.com/office/drawing/2018/hyperlinkcolor" val="tx"/>
+                    </a:ext>
+                  </a:extLst>
+                </a:hlinkClick>
+              </a:rPr>
+              <a:t>gRPC</a:t>
+            </a:r>
+            <a:r>
+              <a:rPr lang="en-US" sz="2400" b="1" dirty="0">
+                <a:solidFill>
+                  <a:srgbClr val="512CD4"/>
+                </a:solidFill>
+                <a:latin typeface="MV Boli" panose="02000500030200090000" pitchFamily="2" charset="0"/>
+                <a:cs typeface="MV Boli" panose="02000500030200090000" pitchFamily="2" charset="0"/>
+                <a:hlinkClick r:id="rId7">
+                  <a:extLst>
+                    <a:ext uri="{A12FA001-AC4F-418D-AE19-62706E023703}">
+                      <ahyp:hlinkClr xmlns:ahyp="http://schemas.microsoft.com/office/drawing/2018/hyperlinkcolor" val="tx"/>
+                    </a:ext>
+                  </a:extLst>
+                </a:hlinkClick>
+              </a:rPr>
+              <a:t> Client Factory | stevejgordon.co.uk</a:t>
+            </a:r>
+            <a:endParaRPr lang="en-US" sz="2400" b="1" dirty="0">
+              <a:solidFill>
+                <a:srgbClr val="512CD4"/>
+              </a:solidFill>
+              <a:latin typeface="MV Boli" panose="02000500030200090000" pitchFamily="2" charset="0"/>
+              <a:cs typeface="MV Boli" panose="02000500030200090000" pitchFamily="2" charset="0"/>
+            </a:endParaRPr>
+          </a:p>
+        </p:txBody>
+      </p:sp>
+    </p:spTree>
+    <p:extLst>
+      <p:ext uri="{BB962C8B-B14F-4D97-AF65-F5344CB8AC3E}">
+        <p14:creationId xmlns:p14="http://schemas.microsoft.com/office/powerpoint/2010/main" val="1976272541"/>
+      </p:ext>
+    </p:extLst>
+  </p:cSld>
+  <p:clrMapOvr>
+    <a:masterClrMapping/>
+  </p:clrMapOvr>
+  <p:timing>
+    <p:tnLst>
+      <p:par>
+        <p:cTn id="1" dur="indefinite" restart="never" nodeType="tmRoot">
+          <p:childTnLst>
+            <p:seq concurrent="1" nextAc="seek">
+              <p:cTn id="2" dur="indefinite" nodeType="mainSeq">
+                <p:childTnLst>
+                  <p:par>
+                    <p:cTn id="3" fill="hold">
+                      <p:stCondLst>
+                        <p:cond delay="indefinite"/>
+                      </p:stCondLst>
+                      <p:childTnLst>
+                        <p:par>
+                          <p:cTn id="4" fill="hold">
+                            <p:stCondLst>
+                              <p:cond delay="0"/>
+                            </p:stCondLst>
+                            <p:childTnLst>
+                              <p:par>
+                                <p:cTn id="5" presetID="37" presetClass="entr" presetSubtype="0" fill="hold" grpId="0" nodeType="clickEffect">
+                                  <p:stCondLst>
+                                    <p:cond delay="0"/>
+                                  </p:stCondLst>
+                                  <p:childTnLst>
+                                    <p:set>
+                                      <p:cBhvr>
+                                        <p:cTn id="6" dur="1" fill="hold">
+                                          <p:stCondLst>
+                                            <p:cond delay="0"/>
+                                          </p:stCondLst>
+                                        </p:cTn>
+                                        <p:tgtEl>
+                                          <p:spTgt spid="3">
+                                            <p:txEl>
+                                              <p:pRg st="0" end="0"/>
+                                            </p:txEl>
+                                          </p:spTgt>
+                                        </p:tgtEl>
+                                        <p:attrNameLst>
+                                          <p:attrName>style.visibility</p:attrName>
+                                        </p:attrNameLst>
+                                      </p:cBhvr>
+                                      <p:to>
+                                        <p:strVal val="visible"/>
+                                      </p:to>
+                                    </p:set>
+                                    <p:animEffect transition="in" filter="fade">
+                                      <p:cBhvr>
+                                        <p:cTn id="7" dur="1000"/>
+                                        <p:tgtEl>
+                                          <p:spTgt spid="3">
+                                            <p:txEl>
+                                              <p:pRg st="0" end="0"/>
+                                            </p:txEl>
+                                          </p:spTgt>
+                                        </p:tgtEl>
+                                      </p:cBhvr>
+                                    </p:animEffect>
+                                    <p:anim calcmode="lin" valueType="num">
+                                      <p:cBhvr>
+                                        <p:cTn id="8" dur="1000" fill="hold"/>
+                                        <p:tgtEl>
+                                          <p:spTgt spid="3">
+                                            <p:txEl>
+                                              <p:pRg st="0" end="0"/>
+                                            </p:txEl>
+                                          </p:spTgt>
+                                        </p:tgtEl>
+                                        <p:attrNameLst>
+                                          <p:attrName>ppt_x</p:attrName>
+                                        </p:attrNameLst>
+                                      </p:cBhvr>
+                                      <p:tavLst>
+                                        <p:tav tm="0">
+                                          <p:val>
+                                            <p:strVal val="#ppt_x"/>
+                                          </p:val>
+                                        </p:tav>
+                                        <p:tav tm="100000">
+                                          <p:val>
+                                            <p:strVal val="#ppt_x"/>
+                                          </p:val>
+                                        </p:tav>
+                                      </p:tavLst>
+                                    </p:anim>
+                                    <p:anim calcmode="lin" valueType="num">
+                                      <p:cBhvr>
+                                        <p:cTn id="9" dur="900" decel="100000" fill="hold"/>
+                                        <p:tgtEl>
+                                          <p:spTgt spid="3">
+                                            <p:txEl>
+                                              <p:pRg st="0" end="0"/>
+                                            </p:txEl>
+                                          </p:spTgt>
+                                        </p:tgtEl>
+                                        <p:attrNameLst>
+                                          <p:attrName>ppt_y</p:attrName>
+                                        </p:attrNameLst>
+                                      </p:cBhvr>
+                                      <p:tavLst>
+                                        <p:tav tm="0">
+                                          <p:val>
+                                            <p:strVal val="#ppt_y+1"/>
+                                          </p:val>
+                                        </p:tav>
+                                        <p:tav tm="100000">
+                                          <p:val>
+                                            <p:strVal val="#ppt_y-.03"/>
+                                          </p:val>
+                                        </p:tav>
+                                      </p:tavLst>
+                                    </p:anim>
+                                    <p:anim calcmode="lin" valueType="num">
+                                      <p:cBhvr>
+                                        <p:cTn id="10" dur="100" accel="100000" fill="hold">
+                                          <p:stCondLst>
+                                            <p:cond delay="900"/>
+                                          </p:stCondLst>
+                                        </p:cTn>
+                                        <p:tgtEl>
+                                          <p:spTgt spid="3">
+                                            <p:txEl>
+                                              <p:pRg st="0" end="0"/>
+                                            </p:txEl>
+                                          </p:spTgt>
+                                        </p:tgtEl>
+                                        <p:attrNameLst>
+                                          <p:attrName>ppt_y</p:attrName>
+                                        </p:attrNameLst>
+                                      </p:cBhvr>
+                                      <p:tavLst>
+                                        <p:tav tm="0">
+                                          <p:val>
+                                            <p:strVal val="#ppt_y-.03"/>
+                                          </p:val>
+                                        </p:tav>
+                                        <p:tav tm="100000">
+                                          <p:val>
+                                            <p:strVal val="#ppt_y"/>
+                                          </p:val>
+                                        </p:tav>
+                                      </p:tavLst>
+                                    </p:anim>
+                                  </p:childTnLst>
+                                </p:cTn>
+                              </p:par>
+                            </p:childTnLst>
+                          </p:cTn>
+                        </p:par>
+                      </p:childTnLst>
+                    </p:cTn>
+                  </p:par>
+                  <p:par>
+                    <p:cTn id="11" fill="hold">
+                      <p:stCondLst>
+                        <p:cond delay="indefinite"/>
+                      </p:stCondLst>
+                      <p:childTnLst>
+                        <p:par>
+                          <p:cTn id="12" fill="hold">
+                            <p:stCondLst>
+                              <p:cond delay="0"/>
+                            </p:stCondLst>
+                            <p:childTnLst>
+                              <p:par>
+                                <p:cTn id="13" presetID="37" presetClass="entr" presetSubtype="0" fill="hold" grpId="0" nodeType="clickEffect">
+                                  <p:stCondLst>
+                                    <p:cond delay="0"/>
+                                  </p:stCondLst>
+                                  <p:childTnLst>
+                                    <p:set>
+                                      <p:cBhvr>
+                                        <p:cTn id="14" dur="1" fill="hold">
+                                          <p:stCondLst>
+                                            <p:cond delay="0"/>
+                                          </p:stCondLst>
+                                        </p:cTn>
+                                        <p:tgtEl>
+                                          <p:spTgt spid="3">
+                                            <p:txEl>
+                                              <p:pRg st="1" end="1"/>
+                                            </p:txEl>
+                                          </p:spTgt>
+                                        </p:tgtEl>
+                                        <p:attrNameLst>
+                                          <p:attrName>style.visibility</p:attrName>
+                                        </p:attrNameLst>
+                                      </p:cBhvr>
+                                      <p:to>
+                                        <p:strVal val="visible"/>
+                                      </p:to>
+                                    </p:set>
+                                    <p:animEffect transition="in" filter="fade">
+                                      <p:cBhvr>
+                                        <p:cTn id="15" dur="1000"/>
+                                        <p:tgtEl>
+                                          <p:spTgt spid="3">
+                                            <p:txEl>
+                                              <p:pRg st="1" end="1"/>
+                                            </p:txEl>
+                                          </p:spTgt>
+                                        </p:tgtEl>
+                                      </p:cBhvr>
+                                    </p:animEffect>
+                                    <p:anim calcmode="lin" valueType="num">
+                                      <p:cBhvr>
+                                        <p:cTn id="16" dur="1000" fill="hold"/>
+                                        <p:tgtEl>
+                                          <p:spTgt spid="3">
+                                            <p:txEl>
+                                              <p:pRg st="1" end="1"/>
+                                            </p:txEl>
+                                          </p:spTgt>
+                                        </p:tgtEl>
+                                        <p:attrNameLst>
+                                          <p:attrName>ppt_x</p:attrName>
+                                        </p:attrNameLst>
+                                      </p:cBhvr>
+                                      <p:tavLst>
+                                        <p:tav tm="0">
+                                          <p:val>
+                                            <p:strVal val="#ppt_x"/>
+                                          </p:val>
+                                        </p:tav>
+                                        <p:tav tm="100000">
+                                          <p:val>
+                                            <p:strVal val="#ppt_x"/>
+                                          </p:val>
+                                        </p:tav>
+                                      </p:tavLst>
+                                    </p:anim>
+                                    <p:anim calcmode="lin" valueType="num">
+                                      <p:cBhvr>
+                                        <p:cTn id="17" dur="900" decel="100000" fill="hold"/>
+                                        <p:tgtEl>
+                                          <p:spTgt spid="3">
+                                            <p:txEl>
+                                              <p:pRg st="1" end="1"/>
+                                            </p:txEl>
+                                          </p:spTgt>
+                                        </p:tgtEl>
+                                        <p:attrNameLst>
+                                          <p:attrName>ppt_y</p:attrName>
+                                        </p:attrNameLst>
+                                      </p:cBhvr>
+                                      <p:tavLst>
+                                        <p:tav tm="0">
+                                          <p:val>
+                                            <p:strVal val="#ppt_y+1"/>
+                                          </p:val>
+                                        </p:tav>
+                                        <p:tav tm="100000">
+                                          <p:val>
+                                            <p:strVal val="#ppt_y-.03"/>
+                                          </p:val>
+                                        </p:tav>
+                                      </p:tavLst>
+                                    </p:anim>
+                                    <p:anim calcmode="lin" valueType="num">
+                                      <p:cBhvr>
+                                        <p:cTn id="18" dur="100" accel="100000" fill="hold">
+                                          <p:stCondLst>
+                                            <p:cond delay="900"/>
+                                          </p:stCondLst>
+                                        </p:cTn>
+                                        <p:tgtEl>
+                                          <p:spTgt spid="3">
+                                            <p:txEl>
+                                              <p:pRg st="1" end="1"/>
+                                            </p:txEl>
+                                          </p:spTgt>
+                                        </p:tgtEl>
+                                        <p:attrNameLst>
+                                          <p:attrName>ppt_y</p:attrName>
+                                        </p:attrNameLst>
+                                      </p:cBhvr>
+                                      <p:tavLst>
+                                        <p:tav tm="0">
+                                          <p:val>
+                                            <p:strVal val="#ppt_y-.03"/>
+                                          </p:val>
+                                        </p:tav>
+                                        <p:tav tm="100000">
+                                          <p:val>
+                                            <p:strVal val="#ppt_y"/>
+                                          </p:val>
+                                        </p:tav>
+                                      </p:tavLst>
+                                    </p:anim>
+                                  </p:childTnLst>
+                                </p:cTn>
+                              </p:par>
+                            </p:childTnLst>
+                          </p:cTn>
+                        </p:par>
+                      </p:childTnLst>
+                    </p:cTn>
+                  </p:par>
+                  <p:par>
+                    <p:cTn id="19" fill="hold">
+                      <p:stCondLst>
+                        <p:cond delay="indefinite"/>
+                      </p:stCondLst>
+                      <p:childTnLst>
+                        <p:par>
+                          <p:cTn id="20" fill="hold">
+                            <p:stCondLst>
+                              <p:cond delay="0"/>
+                            </p:stCondLst>
+                            <p:childTnLst>
+                              <p:par>
+                                <p:cTn id="21" presetID="37" presetClass="entr" presetSubtype="0" fill="hold" grpId="0" nodeType="clickEffect">
+                                  <p:stCondLst>
+                                    <p:cond delay="0"/>
+                                  </p:stCondLst>
+                                  <p:childTnLst>
+                                    <p:set>
+                                      <p:cBhvr>
+                                        <p:cTn id="22" dur="1" fill="hold">
+                                          <p:stCondLst>
+                                            <p:cond delay="0"/>
+                                          </p:stCondLst>
+                                        </p:cTn>
+                                        <p:tgtEl>
+                                          <p:spTgt spid="3">
+                                            <p:txEl>
+                                              <p:pRg st="2" end="2"/>
+                                            </p:txEl>
+                                          </p:spTgt>
+                                        </p:tgtEl>
+                                        <p:attrNameLst>
+                                          <p:attrName>style.visibility</p:attrName>
+                                        </p:attrNameLst>
+                                      </p:cBhvr>
+                                      <p:to>
+                                        <p:strVal val="visible"/>
+                                      </p:to>
+                                    </p:set>
+                                    <p:animEffect transition="in" filter="fade">
+                                      <p:cBhvr>
+                                        <p:cTn id="23" dur="1000"/>
+                                        <p:tgtEl>
+                                          <p:spTgt spid="3">
+                                            <p:txEl>
+                                              <p:pRg st="2" end="2"/>
+                                            </p:txEl>
+                                          </p:spTgt>
+                                        </p:tgtEl>
+                                      </p:cBhvr>
+                                    </p:animEffect>
+                                    <p:anim calcmode="lin" valueType="num">
+                                      <p:cBhvr>
+                                        <p:cTn id="24" dur="1000" fill="hold"/>
+                                        <p:tgtEl>
+                                          <p:spTgt spid="3">
+                                            <p:txEl>
+                                              <p:pRg st="2" end="2"/>
+                                            </p:txEl>
+                                          </p:spTgt>
+                                        </p:tgtEl>
+                                        <p:attrNameLst>
+                                          <p:attrName>ppt_x</p:attrName>
+                                        </p:attrNameLst>
+                                      </p:cBhvr>
+                                      <p:tavLst>
+                                        <p:tav tm="0">
+                                          <p:val>
+                                            <p:strVal val="#ppt_x"/>
+                                          </p:val>
+                                        </p:tav>
+                                        <p:tav tm="100000">
+                                          <p:val>
+                                            <p:strVal val="#ppt_x"/>
+                                          </p:val>
+                                        </p:tav>
+                                      </p:tavLst>
+                                    </p:anim>
+                                    <p:anim calcmode="lin" valueType="num">
+                                      <p:cBhvr>
+                                        <p:cTn id="25" dur="900" decel="100000" fill="hold"/>
+                                        <p:tgtEl>
+                                          <p:spTgt spid="3">
+                                            <p:txEl>
+                                              <p:pRg st="2" end="2"/>
+                                            </p:txEl>
+                                          </p:spTgt>
+                                        </p:tgtEl>
+                                        <p:attrNameLst>
+                                          <p:attrName>ppt_y</p:attrName>
+                                        </p:attrNameLst>
+                                      </p:cBhvr>
+                                      <p:tavLst>
+                                        <p:tav tm="0">
+                                          <p:val>
+                                            <p:strVal val="#ppt_y+1"/>
+                                          </p:val>
+                                        </p:tav>
+                                        <p:tav tm="100000">
+                                          <p:val>
+                                            <p:strVal val="#ppt_y-.03"/>
+                                          </p:val>
+                                        </p:tav>
+                                      </p:tavLst>
+                                    </p:anim>
+                                    <p:anim calcmode="lin" valueType="num">
+                                      <p:cBhvr>
+                                        <p:cTn id="26" dur="100" accel="100000" fill="hold">
+                                          <p:stCondLst>
+                                            <p:cond delay="900"/>
+                                          </p:stCondLst>
+                                        </p:cTn>
+                                        <p:tgtEl>
+                                          <p:spTgt spid="3">
+                                            <p:txEl>
+                                              <p:pRg st="2" end="2"/>
+                                            </p:txEl>
+                                          </p:spTgt>
+                                        </p:tgtEl>
+                                        <p:attrNameLst>
+                                          <p:attrName>ppt_y</p:attrName>
+                                        </p:attrNameLst>
+                                      </p:cBhvr>
+                                      <p:tavLst>
+                                        <p:tav tm="0">
+                                          <p:val>
+                                            <p:strVal val="#ppt_y-.03"/>
+                                          </p:val>
+                                        </p:tav>
+                                        <p:tav tm="100000">
+                                          <p:val>
+                                            <p:strVal val="#ppt_y"/>
+                                          </p:val>
+                                        </p:tav>
+                                      </p:tavLst>
+                                    </p:anim>
+                                  </p:childTnLst>
+                                </p:cTn>
+                              </p:par>
+                            </p:childTnLst>
+                          </p:cTn>
+                        </p:par>
+                      </p:childTnLst>
+                    </p:cTn>
+                  </p:par>
+                  <p:par>
+                    <p:cTn id="27" fill="hold">
+                      <p:stCondLst>
+                        <p:cond delay="indefinite"/>
+                      </p:stCondLst>
+                      <p:childTnLst>
+                        <p:par>
+                          <p:cTn id="28" fill="hold">
+                            <p:stCondLst>
+                              <p:cond delay="0"/>
+                            </p:stCondLst>
+                            <p:childTnLst>
+                              <p:par>
+                                <p:cTn id="29" presetID="37" presetClass="entr" presetSubtype="0" fill="hold" grpId="0" nodeType="clickEffect">
+                                  <p:stCondLst>
+                                    <p:cond delay="0"/>
+                                  </p:stCondLst>
+                                  <p:childTnLst>
+                                    <p:set>
+                                      <p:cBhvr>
+                                        <p:cTn id="30" dur="1" fill="hold">
+                                          <p:stCondLst>
+                                            <p:cond delay="0"/>
+                                          </p:stCondLst>
+                                        </p:cTn>
+                                        <p:tgtEl>
+                                          <p:spTgt spid="3">
+                                            <p:txEl>
+                                              <p:pRg st="3" end="3"/>
+                                            </p:txEl>
+                                          </p:spTgt>
+                                        </p:tgtEl>
+                                        <p:attrNameLst>
+                                          <p:attrName>style.visibility</p:attrName>
+                                        </p:attrNameLst>
+                                      </p:cBhvr>
+                                      <p:to>
+                                        <p:strVal val="visible"/>
+                                      </p:to>
+                                    </p:set>
+                                    <p:animEffect transition="in" filter="fade">
+                                      <p:cBhvr>
+                                        <p:cTn id="31" dur="1000"/>
+                                        <p:tgtEl>
+                                          <p:spTgt spid="3">
+                                            <p:txEl>
+                                              <p:pRg st="3" end="3"/>
+                                            </p:txEl>
+                                          </p:spTgt>
+                                        </p:tgtEl>
+                                      </p:cBhvr>
+                                    </p:animEffect>
+                                    <p:anim calcmode="lin" valueType="num">
+                                      <p:cBhvr>
+                                        <p:cTn id="32" dur="1000" fill="hold"/>
+                                        <p:tgtEl>
+                                          <p:spTgt spid="3">
+                                            <p:txEl>
+                                              <p:pRg st="3" end="3"/>
+                                            </p:txEl>
+                                          </p:spTgt>
+                                        </p:tgtEl>
+                                        <p:attrNameLst>
+                                          <p:attrName>ppt_x</p:attrName>
+                                        </p:attrNameLst>
+                                      </p:cBhvr>
+                                      <p:tavLst>
+                                        <p:tav tm="0">
+                                          <p:val>
+                                            <p:strVal val="#ppt_x"/>
+                                          </p:val>
+                                        </p:tav>
+                                        <p:tav tm="100000">
+                                          <p:val>
+                                            <p:strVal val="#ppt_x"/>
+                                          </p:val>
+                                        </p:tav>
+                                      </p:tavLst>
+                                    </p:anim>
+                                    <p:anim calcmode="lin" valueType="num">
+                                      <p:cBhvr>
+                                        <p:cTn id="33" dur="900" decel="100000" fill="hold"/>
+                                        <p:tgtEl>
+                                          <p:spTgt spid="3">
+                                            <p:txEl>
+                                              <p:pRg st="3" end="3"/>
+                                            </p:txEl>
+                                          </p:spTgt>
+                                        </p:tgtEl>
+                                        <p:attrNameLst>
+                                          <p:attrName>ppt_y</p:attrName>
+                                        </p:attrNameLst>
+                                      </p:cBhvr>
+                                      <p:tavLst>
+                                        <p:tav tm="0">
+                                          <p:val>
+                                            <p:strVal val="#ppt_y+1"/>
+                                          </p:val>
+                                        </p:tav>
+                                        <p:tav tm="100000">
+                                          <p:val>
+                                            <p:strVal val="#ppt_y-.03"/>
+                                          </p:val>
+                                        </p:tav>
+                                      </p:tavLst>
+                                    </p:anim>
+                                    <p:anim calcmode="lin" valueType="num">
+                                      <p:cBhvr>
+                                        <p:cTn id="34" dur="100" accel="100000" fill="hold">
+                                          <p:stCondLst>
+                                            <p:cond delay="900"/>
+                                          </p:stCondLst>
+                                        </p:cTn>
+                                        <p:tgtEl>
+                                          <p:spTgt spid="3">
+                                            <p:txEl>
+                                              <p:pRg st="3" end="3"/>
+                                            </p:txEl>
+                                          </p:spTgt>
+                                        </p:tgtEl>
+                                        <p:attrNameLst>
+                                          <p:attrName>ppt_y</p:attrName>
+                                        </p:attrNameLst>
+                                      </p:cBhvr>
+                                      <p:tavLst>
+                                        <p:tav tm="0">
+                                          <p:val>
+                                            <p:strVal val="#ppt_y-.03"/>
+                                          </p:val>
+                                        </p:tav>
+                                        <p:tav tm="100000">
+                                          <p:val>
+                                            <p:strVal val="#ppt_y"/>
+                                          </p:val>
+                                        </p:tav>
+                                      </p:tavLst>
+                                    </p:anim>
+                                  </p:childTnLst>
+                                </p:cTn>
+                              </p:par>
+                            </p:childTnLst>
+                          </p:cTn>
+                        </p:par>
+                      </p:childTnLst>
+                    </p:cTn>
+                  </p:par>
+                  <p:par>
+                    <p:cTn id="35" fill="hold">
+                      <p:stCondLst>
+                        <p:cond delay="indefinite"/>
+                      </p:stCondLst>
+                      <p:childTnLst>
+                        <p:par>
+                          <p:cTn id="36" fill="hold">
+                            <p:stCondLst>
+                              <p:cond delay="0"/>
+                            </p:stCondLst>
+                            <p:childTnLst>
+                              <p:par>
+                                <p:cTn id="37" presetID="37" presetClass="entr" presetSubtype="0" fill="hold" grpId="0" nodeType="clickEffect">
+                                  <p:stCondLst>
+                                    <p:cond delay="0"/>
+                                  </p:stCondLst>
+                                  <p:childTnLst>
+                                    <p:set>
+                                      <p:cBhvr>
+                                        <p:cTn id="38" dur="1" fill="hold">
+                                          <p:stCondLst>
+                                            <p:cond delay="0"/>
+                                          </p:stCondLst>
+                                        </p:cTn>
+                                        <p:tgtEl>
+                                          <p:spTgt spid="3">
+                                            <p:txEl>
+                                              <p:pRg st="4" end="4"/>
+                                            </p:txEl>
+                                          </p:spTgt>
+                                        </p:tgtEl>
+                                        <p:attrNameLst>
+                                          <p:attrName>style.visibility</p:attrName>
+                                        </p:attrNameLst>
+                                      </p:cBhvr>
+                                      <p:to>
+                                        <p:strVal val="visible"/>
+                                      </p:to>
+                                    </p:set>
+                                    <p:animEffect transition="in" filter="fade">
+                                      <p:cBhvr>
+                                        <p:cTn id="39" dur="1000"/>
+                                        <p:tgtEl>
+                                          <p:spTgt spid="3">
+                                            <p:txEl>
+                                              <p:pRg st="4" end="4"/>
+                                            </p:txEl>
+                                          </p:spTgt>
+                                        </p:tgtEl>
+                                      </p:cBhvr>
+                                    </p:animEffect>
+                                    <p:anim calcmode="lin" valueType="num">
+                                      <p:cBhvr>
+                                        <p:cTn id="40" dur="1000" fill="hold"/>
+                                        <p:tgtEl>
+                                          <p:spTgt spid="3">
+                                            <p:txEl>
+                                              <p:pRg st="4" end="4"/>
+                                            </p:txEl>
+                                          </p:spTgt>
+                                        </p:tgtEl>
+                                        <p:attrNameLst>
+                                          <p:attrName>ppt_x</p:attrName>
+                                        </p:attrNameLst>
+                                      </p:cBhvr>
+                                      <p:tavLst>
+                                        <p:tav tm="0">
+                                          <p:val>
+                                            <p:strVal val="#ppt_x"/>
+                                          </p:val>
+                                        </p:tav>
+                                        <p:tav tm="100000">
+                                          <p:val>
+                                            <p:strVal val="#ppt_x"/>
+                                          </p:val>
+                                        </p:tav>
+                                      </p:tavLst>
+                                    </p:anim>
+                                    <p:anim calcmode="lin" valueType="num">
+                                      <p:cBhvr>
+                                        <p:cTn id="41" dur="900" decel="100000" fill="hold"/>
+                                        <p:tgtEl>
+                                          <p:spTgt spid="3">
+                                            <p:txEl>
+                                              <p:pRg st="4" end="4"/>
+                                            </p:txEl>
+                                          </p:spTgt>
+                                        </p:tgtEl>
+                                        <p:attrNameLst>
+                                          <p:attrName>ppt_y</p:attrName>
+                                        </p:attrNameLst>
+                                      </p:cBhvr>
+                                      <p:tavLst>
+                                        <p:tav tm="0">
+                                          <p:val>
+                                            <p:strVal val="#ppt_y+1"/>
+                                          </p:val>
+                                        </p:tav>
+                                        <p:tav tm="100000">
+                                          <p:val>
+                                            <p:strVal val="#ppt_y-.03"/>
+                                          </p:val>
+                                        </p:tav>
+                                      </p:tavLst>
+                                    </p:anim>
+                                    <p:anim calcmode="lin" valueType="num">
+                                      <p:cBhvr>
+                                        <p:cTn id="42" dur="100" accel="100000" fill="hold">
+                                          <p:stCondLst>
+                                            <p:cond delay="900"/>
+                                          </p:stCondLst>
+                                        </p:cTn>
+                                        <p:tgtEl>
+                                          <p:spTgt spid="3">
+                                            <p:txEl>
+                                              <p:pRg st="4" end="4"/>
+                                            </p:txEl>
+                                          </p:spTgt>
+                                        </p:tgtEl>
+                                        <p:attrNameLst>
+                                          <p:attrName>ppt_y</p:attrName>
+                                        </p:attrNameLst>
+                                      </p:cBhvr>
+                                      <p:tavLst>
+                                        <p:tav tm="0">
+                                          <p:val>
+                                            <p:strVal val="#ppt_y-.03"/>
+                                          </p:val>
+                                        </p:tav>
+                                        <p:tav tm="100000">
+                                          <p:val>
+                                            <p:strVal val="#ppt_y"/>
+                                          </p:val>
+                                        </p:tav>
+                                      </p:tavLst>
+                                    </p:anim>
+                                  </p:childTnLst>
+                                </p:cTn>
+                              </p:par>
+                            </p:childTnLst>
+                          </p:cTn>
+                        </p:par>
+                      </p:childTnLst>
+                    </p:cTn>
+                  </p:par>
+                  <p:par>
+                    <p:cTn id="43" fill="hold">
+                      <p:stCondLst>
+                        <p:cond delay="indefinite"/>
+                      </p:stCondLst>
+                      <p:childTnLst>
+                        <p:par>
+                          <p:cTn id="44" fill="hold">
+                            <p:stCondLst>
+                              <p:cond delay="0"/>
+                            </p:stCondLst>
+                            <p:childTnLst>
+                              <p:par>
+                                <p:cTn id="45" presetID="37" presetClass="entr" presetSubtype="0" fill="hold" grpId="0" nodeType="clickEffect">
+                                  <p:stCondLst>
+                                    <p:cond delay="0"/>
+                                  </p:stCondLst>
+                                  <p:childTnLst>
+                                    <p:set>
+                                      <p:cBhvr>
+                                        <p:cTn id="46" dur="1" fill="hold">
+                                          <p:stCondLst>
+                                            <p:cond delay="0"/>
+                                          </p:stCondLst>
+                                        </p:cTn>
+                                        <p:tgtEl>
+                                          <p:spTgt spid="3">
+                                            <p:txEl>
+                                              <p:pRg st="5" end="5"/>
+                                            </p:txEl>
+                                          </p:spTgt>
+                                        </p:tgtEl>
+                                        <p:attrNameLst>
+                                          <p:attrName>style.visibility</p:attrName>
+                                        </p:attrNameLst>
+                                      </p:cBhvr>
+                                      <p:to>
+                                        <p:strVal val="visible"/>
+                                      </p:to>
+                                    </p:set>
+                                    <p:animEffect transition="in" filter="fade">
+                                      <p:cBhvr>
+                                        <p:cTn id="47" dur="1000"/>
+                                        <p:tgtEl>
+                                          <p:spTgt spid="3">
+                                            <p:txEl>
+                                              <p:pRg st="5" end="5"/>
+                                            </p:txEl>
+                                          </p:spTgt>
+                                        </p:tgtEl>
+                                      </p:cBhvr>
+                                    </p:animEffect>
+                                    <p:anim calcmode="lin" valueType="num">
+                                      <p:cBhvr>
+                                        <p:cTn id="48" dur="1000" fill="hold"/>
+                                        <p:tgtEl>
+                                          <p:spTgt spid="3">
+                                            <p:txEl>
+                                              <p:pRg st="5" end="5"/>
+                                            </p:txEl>
+                                          </p:spTgt>
+                                        </p:tgtEl>
+                                        <p:attrNameLst>
+                                          <p:attrName>ppt_x</p:attrName>
+                                        </p:attrNameLst>
+                                      </p:cBhvr>
+                                      <p:tavLst>
+                                        <p:tav tm="0">
+                                          <p:val>
+                                            <p:strVal val="#ppt_x"/>
+                                          </p:val>
+                                        </p:tav>
+                                        <p:tav tm="100000">
+                                          <p:val>
+                                            <p:strVal val="#ppt_x"/>
+                                          </p:val>
+                                        </p:tav>
+                                      </p:tavLst>
+                                    </p:anim>
+                                    <p:anim calcmode="lin" valueType="num">
+                                      <p:cBhvr>
+                                        <p:cTn id="49" dur="900" decel="100000" fill="hold"/>
+                                        <p:tgtEl>
+                                          <p:spTgt spid="3">
+                                            <p:txEl>
+                                              <p:pRg st="5" end="5"/>
+                                            </p:txEl>
+                                          </p:spTgt>
+                                        </p:tgtEl>
+                                        <p:attrNameLst>
+                                          <p:attrName>ppt_y</p:attrName>
+                                        </p:attrNameLst>
+                                      </p:cBhvr>
+                                      <p:tavLst>
+                                        <p:tav tm="0">
+                                          <p:val>
+                                            <p:strVal val="#ppt_y+1"/>
+                                          </p:val>
+                                        </p:tav>
+                                        <p:tav tm="100000">
+                                          <p:val>
+                                            <p:strVal val="#ppt_y-.03"/>
+                                          </p:val>
+                                        </p:tav>
+                                      </p:tavLst>
+                                    </p:anim>
+                                    <p:anim calcmode="lin" valueType="num">
+                                      <p:cBhvr>
+                                        <p:cTn id="50" dur="100" accel="100000" fill="hold">
+                                          <p:stCondLst>
+                                            <p:cond delay="900"/>
+                                          </p:stCondLst>
+                                        </p:cTn>
+                                        <p:tgtEl>
+                                          <p:spTgt spid="3">
+                                            <p:txEl>
+                                              <p:pRg st="5" end="5"/>
+                                            </p:txEl>
+                                          </p:spTgt>
+                                        </p:tgtEl>
+                                        <p:attrNameLst>
+                                          <p:attrName>ppt_y</p:attrName>
+                                        </p:attrNameLst>
+                                      </p:cBhvr>
+                                      <p:tavLst>
+                                        <p:tav tm="0">
+                                          <p:val>
+                                            <p:strVal val="#ppt_y-.03"/>
+                                          </p:val>
+                                        </p:tav>
+                                        <p:tav tm="100000">
+                                          <p:val>
+                                            <p:strVal val="#ppt_y"/>
+                                          </p:val>
+                                        </p:tav>
+                                      </p:tavLst>
+                                    </p:anim>
+                                  </p:childTnLst>
+                                </p:cTn>
+                              </p:par>
+                            </p:childTnLst>
+                          </p:cTn>
+                        </p:par>
+                      </p:childTnLst>
+                    </p:cTn>
+                  </p:par>
+                </p:childTnLst>
+              </p:cTn>
+              <p:prevCondLst>
+                <p:cond evt="onPrev" delay="0">
+                  <p:tgtEl>
+                    <p:sldTgt/>
+                  </p:tgtEl>
+                </p:cond>
+              </p:prevCondLst>
+              <p:nextCondLst>
+                <p:cond evt="onNext" delay="0">
+                  <p:tgtEl>
+                    <p:sldTgt/>
+                  </p:tgtEl>
+                </p:cond>
+              </p:nextCondLst>
+            </p:seq>
+          </p:childTnLst>
+        </p:cTn>
+      </p:par>
+    </p:tnLst>
+    <p:bldLst>
+      <p:bldP spid="3" grpId="0" build="p"/>
+    </p:bldLst>
+  </p:timing>
+</p:sld>
+</file>
+
+<file path=ppt/slides/slide15.xml><?xml version="1.0" encoding="utf-8"?>
+<p:sld xmlns:a="http://schemas.openxmlformats.org/drawingml/2006/main" xmlns:r="http://schemas.openxmlformats.org/officeDocument/2006/relationships" xmlns:p="http://schemas.openxmlformats.org/presentationml/2006/main">
+  <p:cSld>
+    <p:spTree>
+      <p:nvGrpSpPr>
+        <p:cNvPr id="1" name=""/>
+        <p:cNvGrpSpPr/>
+        <p:nvPr/>
+      </p:nvGrpSpPr>
+      <p:grpSpPr>
+        <a:xfrm>
+          <a:off x="0" y="0"/>
+          <a:ext cx="0" cy="0"/>
+          <a:chOff x="0" y="0"/>
+          <a:chExt cx="0" cy="0"/>
+        </a:xfrm>
+      </p:grpSpPr>
+      <p:sp>
+        <p:nvSpPr>
+          <p:cNvPr id="2" name="Title 1"/>
+          <p:cNvSpPr>
+            <a:spLocks noGrp="1"/>
+          </p:cNvSpPr>
+          <p:nvPr>
+            <p:ph type="title"/>
+          </p:nvPr>
+        </p:nvSpPr>
+        <p:spPr/>
+        <p:txBody>
+          <a:bodyPr>
+            <a:normAutofit/>
+          </a:bodyPr>
+          <a:lstStyle/>
+          <a:p>
+            <a:r>
+              <a:rPr lang="en-US" b="1" dirty="0">
+                <a:latin typeface="Comic Sans MS" panose="030F0702030302020204" pitchFamily="66" charset="0"/>
+                <a:ea typeface="+mn-ea"/>
+                <a:cs typeface="MV Boli" panose="02000500030200090000" pitchFamily="2" charset="0"/>
+              </a:rPr>
+              <a:t>How to connect me</a:t>
+            </a:r>
+          </a:p>
+        </p:txBody>
+      </p:sp>
+      <p:sp>
+        <p:nvSpPr>
+          <p:cNvPr id="3" name="Content Placeholder 2"/>
+          <p:cNvSpPr>
+            <a:spLocks noGrp="1"/>
+          </p:cNvSpPr>
+          <p:nvPr>
+            <p:ph idx="1"/>
+          </p:nvPr>
+        </p:nvSpPr>
+        <p:spPr>
+          <a:xfrm>
+            <a:off x="408371" y="1979721"/>
+            <a:ext cx="11310153" cy="4816134"/>
+          </a:xfrm>
+        </p:spPr>
+        <p:txBody>
+          <a:bodyPr anchor="t">
+            <a:noAutofit/>
+          </a:bodyPr>
+          <a:lstStyle/>
+          <a:p>
+            <a:pPr algn="l" rtl="0">
+              <a:lnSpc>
+                <a:spcPct val="160000"/>
+              </a:lnSpc>
+            </a:pPr>
+            <a:r>
+              <a:rPr lang="en-US" sz="2400" b="1" dirty="0">
+                <a:solidFill>
+                  <a:srgbClr val="512CD4"/>
+                </a:solidFill>
+                <a:latin typeface="MV Boli" panose="02000500030200090000" pitchFamily="2" charset="0"/>
+                <a:cs typeface="MV Boli" panose="02000500030200090000" pitchFamily="2" charset="0"/>
+              </a:rPr>
+              <a:t>Twitter: </a:t>
+            </a:r>
+            <a:r>
+              <a:rPr lang="en-US" sz="2400" b="1" dirty="0">
+                <a:solidFill>
+                  <a:srgbClr val="512CD4"/>
+                </a:solidFill>
+                <a:latin typeface="MV Boli" panose="02000500030200090000" pitchFamily="2" charset="0"/>
+                <a:cs typeface="MV Boli" panose="02000500030200090000" pitchFamily="2" charset="0"/>
+                <a:hlinkClick r:id="rId2">
+                  <a:extLst>
+                    <a:ext uri="{A12FA001-AC4F-418D-AE19-62706E023703}">
+                      <ahyp:hlinkClr xmlns:ahyp="http://schemas.microsoft.com/office/drawing/2018/hyperlinkcolor" val="tx"/>
+                    </a:ext>
+                  </a:extLst>
+                </a:hlinkClick>
+              </a:rPr>
+              <a:t>@_Jinget</a:t>
+            </a:r>
+            <a:endParaRPr lang="en-US" sz="2400" b="1" dirty="0">
+              <a:solidFill>
+                <a:srgbClr val="512CD4"/>
+              </a:solidFill>
+              <a:latin typeface="MV Boli" panose="02000500030200090000" pitchFamily="2" charset="0"/>
+              <a:cs typeface="MV Boli" panose="02000500030200090000" pitchFamily="2" charset="0"/>
+            </a:endParaRPr>
+          </a:p>
+          <a:p>
+            <a:pPr algn="l" rtl="0">
+              <a:lnSpc>
+                <a:spcPct val="160000"/>
+              </a:lnSpc>
+            </a:pPr>
+            <a:r>
+              <a:rPr lang="en-US" sz="2400" b="1" dirty="0">
+                <a:solidFill>
+                  <a:srgbClr val="512CD4"/>
+                </a:solidFill>
+                <a:latin typeface="MV Boli" panose="02000500030200090000" pitchFamily="2" charset="0"/>
+                <a:cs typeface="MV Boli" panose="02000500030200090000" pitchFamily="2" charset="0"/>
+              </a:rPr>
+              <a:t>LinkedIn: </a:t>
+            </a:r>
+            <a:r>
+              <a:rPr lang="en-US" sz="2400" b="1" dirty="0">
+                <a:solidFill>
+                  <a:srgbClr val="512CD4"/>
+                </a:solidFill>
+                <a:latin typeface="MV Boli" panose="02000500030200090000" pitchFamily="2" charset="0"/>
+                <a:cs typeface="MV Boli" panose="02000500030200090000" pitchFamily="2" charset="0"/>
+                <a:hlinkClick r:id="rId3">
+                  <a:extLst>
+                    <a:ext uri="{A12FA001-AC4F-418D-AE19-62706E023703}">
+                      <ahyp:hlinkClr xmlns:ahyp="http://schemas.microsoft.com/office/drawing/2018/hyperlinkcolor" val="tx"/>
+                    </a:ext>
+                  </a:extLst>
+                </a:hlinkClick>
+              </a:rPr>
+              <a:t>VFarahmandian</a:t>
+            </a:r>
+            <a:endParaRPr lang="en-US" sz="2400" b="1" dirty="0">
+              <a:solidFill>
+                <a:srgbClr val="512CD4"/>
+              </a:solidFill>
+              <a:latin typeface="MV Boli" panose="02000500030200090000" pitchFamily="2" charset="0"/>
+              <a:cs typeface="MV Boli" panose="02000500030200090000" pitchFamily="2" charset="0"/>
+            </a:endParaRPr>
+          </a:p>
+          <a:p>
+            <a:pPr algn="l" rtl="0">
+              <a:lnSpc>
+                <a:spcPct val="160000"/>
+              </a:lnSpc>
+            </a:pPr>
+            <a:r>
+              <a:rPr lang="en-US" sz="2400" b="1" dirty="0">
+                <a:solidFill>
+                  <a:srgbClr val="512CD4"/>
+                </a:solidFill>
+                <a:latin typeface="MV Boli" panose="02000500030200090000" pitchFamily="2" charset="0"/>
+                <a:cs typeface="MV Boli" panose="02000500030200090000" pitchFamily="2" charset="0"/>
+              </a:rPr>
+              <a:t>GitHub: </a:t>
+            </a:r>
+            <a:r>
+              <a:rPr lang="en-US" sz="2400" b="1" dirty="0">
+                <a:solidFill>
+                  <a:srgbClr val="512CD4"/>
+                </a:solidFill>
+                <a:latin typeface="MV Boli" panose="02000500030200090000" pitchFamily="2" charset="0"/>
+                <a:cs typeface="MV Boli" panose="02000500030200090000" pitchFamily="2" charset="0"/>
+                <a:hlinkClick r:id="rId4">
+                  <a:extLst>
+                    <a:ext uri="{A12FA001-AC4F-418D-AE19-62706E023703}">
+                      <ahyp:hlinkClr xmlns:ahyp="http://schemas.microsoft.com/office/drawing/2018/hyperlinkcolor" val="tx"/>
+                    </a:ext>
+                  </a:extLst>
+                </a:hlinkClick>
+              </a:rPr>
+              <a:t>VahidFarahmandian</a:t>
+            </a:r>
+            <a:endParaRPr lang="en-US" sz="2400" b="1" dirty="0">
+              <a:solidFill>
+                <a:srgbClr val="512CD4"/>
+              </a:solidFill>
+              <a:latin typeface="MV Boli" panose="02000500030200090000" pitchFamily="2" charset="0"/>
+              <a:cs typeface="MV Boli" panose="02000500030200090000" pitchFamily="2" charset="0"/>
+            </a:endParaRPr>
+          </a:p>
+          <a:p>
+            <a:pPr algn="l" rtl="0">
+              <a:lnSpc>
+                <a:spcPct val="160000"/>
+              </a:lnSpc>
+            </a:pPr>
+            <a:r>
+              <a:rPr lang="en-US" sz="2400" b="1" dirty="0">
+                <a:solidFill>
+                  <a:srgbClr val="512CD4"/>
+                </a:solidFill>
+                <a:latin typeface="MV Boli" panose="02000500030200090000" pitchFamily="2" charset="0"/>
+                <a:cs typeface="MV Boli" panose="02000500030200090000" pitchFamily="2" charset="0"/>
+              </a:rPr>
+              <a:t>Email: </a:t>
+            </a:r>
+            <a:r>
+              <a:rPr lang="en-US" sz="2400" b="1" dirty="0">
+                <a:solidFill>
+                  <a:srgbClr val="512CD4"/>
+                </a:solidFill>
+                <a:latin typeface="MV Boli" panose="02000500030200090000" pitchFamily="2" charset="0"/>
+                <a:cs typeface="MV Boli" panose="02000500030200090000" pitchFamily="2" charset="0"/>
+                <a:hlinkClick r:id="rId5">
+                  <a:extLst>
+                    <a:ext uri="{A12FA001-AC4F-418D-AE19-62706E023703}">
+                      <ahyp:hlinkClr xmlns:ahyp="http://schemas.microsoft.com/office/drawing/2018/hyperlinkcolor" val="tx"/>
+                    </a:ext>
+                  </a:extLst>
+                </a:hlinkClick>
+              </a:rPr>
+              <a:t>farahmandian2011@gmail.com</a:t>
+            </a:r>
+            <a:endParaRPr lang="en-US" sz="2400" b="1" dirty="0">
+              <a:solidFill>
+                <a:srgbClr val="512CD4"/>
+              </a:solidFill>
+              <a:latin typeface="MV Boli" panose="02000500030200090000" pitchFamily="2" charset="0"/>
+              <a:cs typeface="MV Boli" panose="02000500030200090000" pitchFamily="2" charset="0"/>
+            </a:endParaRPr>
+          </a:p>
+        </p:txBody>
+      </p:sp>
+      <p:pic>
+        <p:nvPicPr>
+          <p:cNvPr id="5" name="Picture 4">
+            <a:extLst>
+              <a:ext uri="{FF2B5EF4-FFF2-40B4-BE49-F238E27FC236}">
+                <a16:creationId xmlns:a16="http://schemas.microsoft.com/office/drawing/2014/main" id="{2FDF7929-545E-48DD-BEFE-B7D7780B0956}"/>
+              </a:ext>
+            </a:extLst>
+          </p:cNvPr>
+          <p:cNvPicPr>
+            <a:picLocks noChangeAspect="1"/>
+          </p:cNvPicPr>
+          <p:nvPr/>
+        </p:nvPicPr>
+        <p:blipFill>
+          <a:blip r:embed="rId6"/>
+          <a:stretch>
+            <a:fillRect/>
+          </a:stretch>
+        </p:blipFill>
+        <p:spPr>
+          <a:xfrm>
+            <a:off x="8564051" y="2203906"/>
+            <a:ext cx="3154473" cy="3909769"/>
+          </a:xfrm>
+          <a:prstGeom prst="rect">
+            <a:avLst/>
+          </a:prstGeom>
+        </p:spPr>
+      </p:pic>
+    </p:spTree>
+    <p:extLst>
+      <p:ext uri="{BB962C8B-B14F-4D97-AF65-F5344CB8AC3E}">
+        <p14:creationId xmlns:p14="http://schemas.microsoft.com/office/powerpoint/2010/main" val="47757822"/>
+      </p:ext>
+    </p:extLst>
+  </p:cSld>
+  <p:clrMapOvr>
+    <a:masterClrMapping/>
+  </p:clrMapOvr>
+  <p:timing>
+    <p:tnLst>
+      <p:par>
+        <p:cTn id="1" dur="indefinite" restart="never" nodeType="tmRoot">
+          <p:childTnLst>
+            <p:seq concurrent="1" nextAc="seek">
+              <p:cTn id="2" dur="indefinite" nodeType="mainSeq">
+                <p:childTnLst>
+                  <p:par>
+                    <p:cTn id="3" fill="hold">
+                      <p:stCondLst>
+                        <p:cond delay="indefinite"/>
+                      </p:stCondLst>
+                      <p:childTnLst>
+                        <p:par>
+                          <p:cTn id="4" fill="hold">
+                            <p:stCondLst>
+                              <p:cond delay="0"/>
+                            </p:stCondLst>
+                            <p:childTnLst>
+                              <p:par>
+                                <p:cTn id="5" presetID="37" presetClass="entr" presetSubtype="0" fill="hold" grpId="0" nodeType="clickEffect">
+                                  <p:stCondLst>
+                                    <p:cond delay="0"/>
+                                  </p:stCondLst>
+                                  <p:childTnLst>
+                                    <p:set>
+                                      <p:cBhvr>
+                                        <p:cTn id="6" dur="1" fill="hold">
+                                          <p:stCondLst>
+                                            <p:cond delay="0"/>
+                                          </p:stCondLst>
+                                        </p:cTn>
+                                        <p:tgtEl>
+                                          <p:spTgt spid="3">
+                                            <p:txEl>
+                                              <p:pRg st="0" end="0"/>
+                                            </p:txEl>
+                                          </p:spTgt>
+                                        </p:tgtEl>
+                                        <p:attrNameLst>
+                                          <p:attrName>style.visibility</p:attrName>
+                                        </p:attrNameLst>
+                                      </p:cBhvr>
+                                      <p:to>
+                                        <p:strVal val="visible"/>
+                                      </p:to>
+                                    </p:set>
+                                    <p:animEffect transition="in" filter="fade">
+                                      <p:cBhvr>
+                                        <p:cTn id="7" dur="1000"/>
+                                        <p:tgtEl>
+                                          <p:spTgt spid="3">
+                                            <p:txEl>
+                                              <p:pRg st="0" end="0"/>
+                                            </p:txEl>
+                                          </p:spTgt>
+                                        </p:tgtEl>
+                                      </p:cBhvr>
+                                    </p:animEffect>
+                                    <p:anim calcmode="lin" valueType="num">
+                                      <p:cBhvr>
+                                        <p:cTn id="8" dur="1000" fill="hold"/>
+                                        <p:tgtEl>
+                                          <p:spTgt spid="3">
+                                            <p:txEl>
+                                              <p:pRg st="0" end="0"/>
+                                            </p:txEl>
+                                          </p:spTgt>
+                                        </p:tgtEl>
+                                        <p:attrNameLst>
+                                          <p:attrName>ppt_x</p:attrName>
+                                        </p:attrNameLst>
+                                      </p:cBhvr>
+                                      <p:tavLst>
+                                        <p:tav tm="0">
+                                          <p:val>
+                                            <p:strVal val="#ppt_x"/>
+                                          </p:val>
+                                        </p:tav>
+                                        <p:tav tm="100000">
+                                          <p:val>
+                                            <p:strVal val="#ppt_x"/>
+                                          </p:val>
+                                        </p:tav>
+                                      </p:tavLst>
+                                    </p:anim>
+                                    <p:anim calcmode="lin" valueType="num">
+                                      <p:cBhvr>
+                                        <p:cTn id="9" dur="900" decel="100000" fill="hold"/>
+                                        <p:tgtEl>
+                                          <p:spTgt spid="3">
+                                            <p:txEl>
+                                              <p:pRg st="0" end="0"/>
+                                            </p:txEl>
+                                          </p:spTgt>
+                                        </p:tgtEl>
+                                        <p:attrNameLst>
+                                          <p:attrName>ppt_y</p:attrName>
+                                        </p:attrNameLst>
+                                      </p:cBhvr>
+                                      <p:tavLst>
+                                        <p:tav tm="0">
+                                          <p:val>
+                                            <p:strVal val="#ppt_y+1"/>
+                                          </p:val>
+                                        </p:tav>
+                                        <p:tav tm="100000">
+                                          <p:val>
+                                            <p:strVal val="#ppt_y-.03"/>
+                                          </p:val>
+                                        </p:tav>
+                                      </p:tavLst>
+                                    </p:anim>
+                                    <p:anim calcmode="lin" valueType="num">
+                                      <p:cBhvr>
+                                        <p:cTn id="10" dur="100" accel="100000" fill="hold">
+                                          <p:stCondLst>
+                                            <p:cond delay="900"/>
+                                          </p:stCondLst>
+                                        </p:cTn>
+                                        <p:tgtEl>
+                                          <p:spTgt spid="3">
+                                            <p:txEl>
+                                              <p:pRg st="0" end="0"/>
+                                            </p:txEl>
+                                          </p:spTgt>
+                                        </p:tgtEl>
+                                        <p:attrNameLst>
+                                          <p:attrName>ppt_y</p:attrName>
+                                        </p:attrNameLst>
+                                      </p:cBhvr>
+                                      <p:tavLst>
+                                        <p:tav tm="0">
+                                          <p:val>
+                                            <p:strVal val="#ppt_y-.03"/>
+                                          </p:val>
+                                        </p:tav>
+                                        <p:tav tm="100000">
+                                          <p:val>
+                                            <p:strVal val="#ppt_y"/>
+                                          </p:val>
+                                        </p:tav>
+                                      </p:tavLst>
+                                    </p:anim>
+                                  </p:childTnLst>
+                                </p:cTn>
+                              </p:par>
+                            </p:childTnLst>
+                          </p:cTn>
+                        </p:par>
+                      </p:childTnLst>
+                    </p:cTn>
+                  </p:par>
+                  <p:par>
+                    <p:cTn id="11" fill="hold">
+                      <p:stCondLst>
+                        <p:cond delay="indefinite"/>
+                      </p:stCondLst>
+                      <p:childTnLst>
+                        <p:par>
+                          <p:cTn id="12" fill="hold">
+                            <p:stCondLst>
+                              <p:cond delay="0"/>
+                            </p:stCondLst>
+                            <p:childTnLst>
+                              <p:par>
+                                <p:cTn id="13" presetID="37" presetClass="entr" presetSubtype="0" fill="hold" grpId="0" nodeType="clickEffect">
+                                  <p:stCondLst>
+                                    <p:cond delay="0"/>
+                                  </p:stCondLst>
+                                  <p:childTnLst>
+                                    <p:set>
+                                      <p:cBhvr>
+                                        <p:cTn id="14" dur="1" fill="hold">
+                                          <p:stCondLst>
+                                            <p:cond delay="0"/>
+                                          </p:stCondLst>
+                                        </p:cTn>
+                                        <p:tgtEl>
+                                          <p:spTgt spid="3">
+                                            <p:txEl>
+                                              <p:pRg st="1" end="1"/>
+                                            </p:txEl>
+                                          </p:spTgt>
+                                        </p:tgtEl>
+                                        <p:attrNameLst>
+                                          <p:attrName>style.visibility</p:attrName>
+                                        </p:attrNameLst>
+                                      </p:cBhvr>
+                                      <p:to>
+                                        <p:strVal val="visible"/>
+                                      </p:to>
+                                    </p:set>
+                                    <p:animEffect transition="in" filter="fade">
+                                      <p:cBhvr>
+                                        <p:cTn id="15" dur="1000"/>
+                                        <p:tgtEl>
+                                          <p:spTgt spid="3">
+                                            <p:txEl>
+                                              <p:pRg st="1" end="1"/>
+                                            </p:txEl>
+                                          </p:spTgt>
+                                        </p:tgtEl>
+                                      </p:cBhvr>
+                                    </p:animEffect>
+                                    <p:anim calcmode="lin" valueType="num">
+                                      <p:cBhvr>
+                                        <p:cTn id="16" dur="1000" fill="hold"/>
+                                        <p:tgtEl>
+                                          <p:spTgt spid="3">
+                                            <p:txEl>
+                                              <p:pRg st="1" end="1"/>
+                                            </p:txEl>
+                                          </p:spTgt>
+                                        </p:tgtEl>
+                                        <p:attrNameLst>
+                                          <p:attrName>ppt_x</p:attrName>
+                                        </p:attrNameLst>
+                                      </p:cBhvr>
+                                      <p:tavLst>
+                                        <p:tav tm="0">
+                                          <p:val>
+                                            <p:strVal val="#ppt_x"/>
+                                          </p:val>
+                                        </p:tav>
+                                        <p:tav tm="100000">
+                                          <p:val>
+                                            <p:strVal val="#ppt_x"/>
+                                          </p:val>
+                                        </p:tav>
+                                      </p:tavLst>
+                                    </p:anim>
+                                    <p:anim calcmode="lin" valueType="num">
+                                      <p:cBhvr>
+                                        <p:cTn id="17" dur="900" decel="100000" fill="hold"/>
+                                        <p:tgtEl>
+                                          <p:spTgt spid="3">
+                                            <p:txEl>
+                                              <p:pRg st="1" end="1"/>
+                                            </p:txEl>
+                                          </p:spTgt>
+                                        </p:tgtEl>
+                                        <p:attrNameLst>
+                                          <p:attrName>ppt_y</p:attrName>
+                                        </p:attrNameLst>
+                                      </p:cBhvr>
+                                      <p:tavLst>
+                                        <p:tav tm="0">
+                                          <p:val>
+                                            <p:strVal val="#ppt_y+1"/>
+                                          </p:val>
+                                        </p:tav>
+                                        <p:tav tm="100000">
+                                          <p:val>
+                                            <p:strVal val="#ppt_y-.03"/>
+                                          </p:val>
+                                        </p:tav>
+                                      </p:tavLst>
+                                    </p:anim>
+                                    <p:anim calcmode="lin" valueType="num">
+                                      <p:cBhvr>
+                                        <p:cTn id="18" dur="100" accel="100000" fill="hold">
+                                          <p:stCondLst>
+                                            <p:cond delay="900"/>
+                                          </p:stCondLst>
+                                        </p:cTn>
+                                        <p:tgtEl>
+                                          <p:spTgt spid="3">
+                                            <p:txEl>
+                                              <p:pRg st="1" end="1"/>
+                                            </p:txEl>
+                                          </p:spTgt>
+                                        </p:tgtEl>
+                                        <p:attrNameLst>
+                                          <p:attrName>ppt_y</p:attrName>
+                                        </p:attrNameLst>
+                                      </p:cBhvr>
+                                      <p:tavLst>
+                                        <p:tav tm="0">
+                                          <p:val>
+                                            <p:strVal val="#ppt_y-.03"/>
+                                          </p:val>
+                                        </p:tav>
+                                        <p:tav tm="100000">
+                                          <p:val>
+                                            <p:strVal val="#ppt_y"/>
+                                          </p:val>
+                                        </p:tav>
+                                      </p:tavLst>
+                                    </p:anim>
+                                  </p:childTnLst>
+                                </p:cTn>
+                              </p:par>
+                            </p:childTnLst>
+                          </p:cTn>
+                        </p:par>
+                      </p:childTnLst>
+                    </p:cTn>
+                  </p:par>
+                  <p:par>
+                    <p:cTn id="19" fill="hold">
+                      <p:stCondLst>
+                        <p:cond delay="indefinite"/>
+                      </p:stCondLst>
+                      <p:childTnLst>
+                        <p:par>
+                          <p:cTn id="20" fill="hold">
+                            <p:stCondLst>
+                              <p:cond delay="0"/>
+                            </p:stCondLst>
+                            <p:childTnLst>
+                              <p:par>
+                                <p:cTn id="21" presetID="37" presetClass="entr" presetSubtype="0" fill="hold" grpId="0" nodeType="clickEffect">
+                                  <p:stCondLst>
+                                    <p:cond delay="0"/>
+                                  </p:stCondLst>
+                                  <p:childTnLst>
+                                    <p:set>
+                                      <p:cBhvr>
+                                        <p:cTn id="22" dur="1" fill="hold">
+                                          <p:stCondLst>
+                                            <p:cond delay="0"/>
+                                          </p:stCondLst>
+                                        </p:cTn>
+                                        <p:tgtEl>
+                                          <p:spTgt spid="3">
+                                            <p:txEl>
+                                              <p:pRg st="2" end="2"/>
+                                            </p:txEl>
+                                          </p:spTgt>
+                                        </p:tgtEl>
+                                        <p:attrNameLst>
+                                          <p:attrName>style.visibility</p:attrName>
+                                        </p:attrNameLst>
+                                      </p:cBhvr>
+                                      <p:to>
+                                        <p:strVal val="visible"/>
+                                      </p:to>
+                                    </p:set>
+                                    <p:animEffect transition="in" filter="fade">
+                                      <p:cBhvr>
+                                        <p:cTn id="23" dur="1000"/>
+                                        <p:tgtEl>
+                                          <p:spTgt spid="3">
+                                            <p:txEl>
+                                              <p:pRg st="2" end="2"/>
+                                            </p:txEl>
+                                          </p:spTgt>
+                                        </p:tgtEl>
+                                      </p:cBhvr>
+                                    </p:animEffect>
+                                    <p:anim calcmode="lin" valueType="num">
+                                      <p:cBhvr>
+                                        <p:cTn id="24" dur="1000" fill="hold"/>
+                                        <p:tgtEl>
+                                          <p:spTgt spid="3">
+                                            <p:txEl>
+                                              <p:pRg st="2" end="2"/>
+                                            </p:txEl>
+                                          </p:spTgt>
+                                        </p:tgtEl>
+                                        <p:attrNameLst>
+                                          <p:attrName>ppt_x</p:attrName>
+                                        </p:attrNameLst>
+                                      </p:cBhvr>
+                                      <p:tavLst>
+                                        <p:tav tm="0">
+                                          <p:val>
+                                            <p:strVal val="#ppt_x"/>
+                                          </p:val>
+                                        </p:tav>
+                                        <p:tav tm="100000">
+                                          <p:val>
+                                            <p:strVal val="#ppt_x"/>
+                                          </p:val>
+                                        </p:tav>
+                                      </p:tavLst>
+                                    </p:anim>
+                                    <p:anim calcmode="lin" valueType="num">
+                                      <p:cBhvr>
+                                        <p:cTn id="25" dur="900" decel="100000" fill="hold"/>
+                                        <p:tgtEl>
+                                          <p:spTgt spid="3">
+                                            <p:txEl>
+                                              <p:pRg st="2" end="2"/>
+                                            </p:txEl>
+                                          </p:spTgt>
+                                        </p:tgtEl>
+                                        <p:attrNameLst>
+                                          <p:attrName>ppt_y</p:attrName>
+                                        </p:attrNameLst>
+                                      </p:cBhvr>
+                                      <p:tavLst>
+                                        <p:tav tm="0">
+                                          <p:val>
+                                            <p:strVal val="#ppt_y+1"/>
+                                          </p:val>
+                                        </p:tav>
+                                        <p:tav tm="100000">
+                                          <p:val>
+                                            <p:strVal val="#ppt_y-.03"/>
+                                          </p:val>
+                                        </p:tav>
+                                      </p:tavLst>
+                                    </p:anim>
+                                    <p:anim calcmode="lin" valueType="num">
+                                      <p:cBhvr>
+                                        <p:cTn id="26" dur="100" accel="100000" fill="hold">
+                                          <p:stCondLst>
+                                            <p:cond delay="900"/>
+                                          </p:stCondLst>
+                                        </p:cTn>
+                                        <p:tgtEl>
+                                          <p:spTgt spid="3">
+                                            <p:txEl>
+                                              <p:pRg st="2" end="2"/>
+                                            </p:txEl>
+                                          </p:spTgt>
+                                        </p:tgtEl>
+                                        <p:attrNameLst>
+                                          <p:attrName>ppt_y</p:attrName>
+                                        </p:attrNameLst>
+                                      </p:cBhvr>
+                                      <p:tavLst>
+                                        <p:tav tm="0">
+                                          <p:val>
+                                            <p:strVal val="#ppt_y-.03"/>
+                                          </p:val>
+                                        </p:tav>
+                                        <p:tav tm="100000">
+                                          <p:val>
+                                            <p:strVal val="#ppt_y"/>
+                                          </p:val>
+                                        </p:tav>
+                                      </p:tavLst>
+                                    </p:anim>
+                                  </p:childTnLst>
+                                </p:cTn>
+                              </p:par>
+                            </p:childTnLst>
+                          </p:cTn>
+                        </p:par>
+                      </p:childTnLst>
+                    </p:cTn>
+                  </p:par>
+                  <p:par>
+                    <p:cTn id="27" fill="hold">
+                      <p:stCondLst>
+                        <p:cond delay="indefinite"/>
+                      </p:stCondLst>
+                      <p:childTnLst>
+                        <p:par>
+                          <p:cTn id="28" fill="hold">
+                            <p:stCondLst>
+                              <p:cond delay="0"/>
+                            </p:stCondLst>
+                            <p:childTnLst>
+                              <p:par>
+                                <p:cTn id="29" presetID="37" presetClass="entr" presetSubtype="0" fill="hold" grpId="0" nodeType="clickEffect">
+                                  <p:stCondLst>
+                                    <p:cond delay="0"/>
+                                  </p:stCondLst>
+                                  <p:childTnLst>
+                                    <p:set>
+                                      <p:cBhvr>
+                                        <p:cTn id="30" dur="1" fill="hold">
+                                          <p:stCondLst>
+                                            <p:cond delay="0"/>
+                                          </p:stCondLst>
+                                        </p:cTn>
+                                        <p:tgtEl>
+                                          <p:spTgt spid="3">
+                                            <p:txEl>
+                                              <p:pRg st="3" end="3"/>
+                                            </p:txEl>
+                                          </p:spTgt>
+                                        </p:tgtEl>
+                                        <p:attrNameLst>
+                                          <p:attrName>style.visibility</p:attrName>
+                                        </p:attrNameLst>
+                                      </p:cBhvr>
+                                      <p:to>
+                                        <p:strVal val="visible"/>
+                                      </p:to>
+                                    </p:set>
+                                    <p:animEffect transition="in" filter="fade">
+                                      <p:cBhvr>
+                                        <p:cTn id="31" dur="1000"/>
+                                        <p:tgtEl>
+                                          <p:spTgt spid="3">
+                                            <p:txEl>
+                                              <p:pRg st="3" end="3"/>
+                                            </p:txEl>
+                                          </p:spTgt>
+                                        </p:tgtEl>
+                                      </p:cBhvr>
+                                    </p:animEffect>
+                                    <p:anim calcmode="lin" valueType="num">
+                                      <p:cBhvr>
+                                        <p:cTn id="32" dur="1000" fill="hold"/>
+                                        <p:tgtEl>
+                                          <p:spTgt spid="3">
+                                            <p:txEl>
+                                              <p:pRg st="3" end="3"/>
+                                            </p:txEl>
+                                          </p:spTgt>
+                                        </p:tgtEl>
+                                        <p:attrNameLst>
+                                          <p:attrName>ppt_x</p:attrName>
+                                        </p:attrNameLst>
+                                      </p:cBhvr>
+                                      <p:tavLst>
+                                        <p:tav tm="0">
+                                          <p:val>
+                                            <p:strVal val="#ppt_x"/>
+                                          </p:val>
+                                        </p:tav>
+                                        <p:tav tm="100000">
+                                          <p:val>
+                                            <p:strVal val="#ppt_x"/>
+                                          </p:val>
+                                        </p:tav>
+                                      </p:tavLst>
+                                    </p:anim>
+                                    <p:anim calcmode="lin" valueType="num">
+                                      <p:cBhvr>
+                                        <p:cTn id="33" dur="900" decel="100000" fill="hold"/>
+                                        <p:tgtEl>
+                                          <p:spTgt spid="3">
+                                            <p:txEl>
+                                              <p:pRg st="3" end="3"/>
+                                            </p:txEl>
+                                          </p:spTgt>
+                                        </p:tgtEl>
+                                        <p:attrNameLst>
+                                          <p:attrName>ppt_y</p:attrName>
+                                        </p:attrNameLst>
+                                      </p:cBhvr>
+                                      <p:tavLst>
+                                        <p:tav tm="0">
+                                          <p:val>
+                                            <p:strVal val="#ppt_y+1"/>
+                                          </p:val>
+                                        </p:tav>
+                                        <p:tav tm="100000">
+                                          <p:val>
+                                            <p:strVal val="#ppt_y-.03"/>
+                                          </p:val>
+                                        </p:tav>
+                                      </p:tavLst>
+                                    </p:anim>
+                                    <p:anim calcmode="lin" valueType="num">
+                                      <p:cBhvr>
+                                        <p:cTn id="34" dur="100" accel="100000" fill="hold">
+                                          <p:stCondLst>
+                                            <p:cond delay="900"/>
+                                          </p:stCondLst>
+                                        </p:cTn>
+                                        <p:tgtEl>
+                                          <p:spTgt spid="3">
+                                            <p:txEl>
+                                              <p:pRg st="3" end="3"/>
+                                            </p:txEl>
+                                          </p:spTgt>
+                                        </p:tgtEl>
+                                        <p:attrNameLst>
+                                          <p:attrName>ppt_y</p:attrName>
+                                        </p:attrNameLst>
+                                      </p:cBhvr>
+                                      <p:tavLst>
+                                        <p:tav tm="0">
+                                          <p:val>
+                                            <p:strVal val="#ppt_y-.03"/>
+                                          </p:val>
+                                        </p:tav>
+                                        <p:tav tm="100000">
+                                          <p:val>
+                                            <p:strVal val="#ppt_y"/>
+                                          </p:val>
+                                        </p:tav>
+                                      </p:tavLst>
+                                    </p:anim>
+                                  </p:childTnLst>
+                                </p:cTn>
+                              </p:par>
+                            </p:childTnLst>
+                          </p:cTn>
+                        </p:par>
+                      </p:childTnLst>
+                    </p:cTn>
+                  </p:par>
+                </p:childTnLst>
+              </p:cTn>
+              <p:prevCondLst>
+                <p:cond evt="onPrev" delay="0">
+                  <p:tgtEl>
+                    <p:sldTgt/>
+                  </p:tgtEl>
+                </p:cond>
+              </p:prevCondLst>
+              <p:nextCondLst>
+                <p:cond evt="onNext" delay="0">
+                  <p:tgtEl>
+                    <p:sldTgt/>
+                  </p:tgtEl>
+                </p:cond>
+              </p:nextCondLst>
+            </p:seq>
+          </p:childTnLst>
+        </p:cTn>
+      </p:par>
+    </p:tnLst>
+    <p:bldLst>
+      <p:bldP spid="3" grpId="0" build="p"/>
+    </p:bldLst>
+  </p:timing>
+</p:sld>
+</file>
+
 <file path=ppt/slides/slide2.xml><?xml version="1.0" encoding="utf-8"?>
 <p:sld xmlns:a="http://schemas.openxmlformats.org/drawingml/2006/main" xmlns:r="http://schemas.openxmlformats.org/officeDocument/2006/relationships" xmlns:p="http://schemas.openxmlformats.org/presentationml/2006/main">
   <p:cSld>
@@ -13896,7 +16153,7 @@
           <a:p>
             <a:r>
               <a:rPr lang="en-US" b="1" dirty="0">
-                <a:latin typeface="Cody" pitchFamily="2" charset="0"/>
+                <a:latin typeface="Comic Sans MS" panose="030F0702030302020204" pitchFamily="66" charset="0"/>
                 <a:ea typeface="+mn-ea"/>
                 <a:cs typeface="MV Boli" panose="02000500030200090000" pitchFamily="2" charset="0"/>
               </a:rPr>
@@ -15065,6 +17322,109 @@
                       </p:childTnLst>
                     </p:cTn>
                   </p:par>
+                  <p:par>
+                    <p:cTn id="51" fill="hold">
+                      <p:stCondLst>
+                        <p:cond delay="indefinite"/>
+                      </p:stCondLst>
+                      <p:childTnLst>
+                        <p:par>
+                          <p:cTn id="52" fill="hold">
+                            <p:stCondLst>
+                              <p:cond delay="0"/>
+                            </p:stCondLst>
+                            <p:childTnLst>
+                              <p:par>
+                                <p:cTn id="53" presetID="2" presetClass="entr" presetSubtype="4" fill="hold" nodeType="clickEffect">
+                                  <p:stCondLst>
+                                    <p:cond delay="0"/>
+                                  </p:stCondLst>
+                                  <p:childTnLst>
+                                    <p:set>
+                                      <p:cBhvr>
+                                        <p:cTn id="54" dur="1" fill="hold">
+                                          <p:stCondLst>
+                                            <p:cond delay="0"/>
+                                          </p:stCondLst>
+                                        </p:cTn>
+                                        <p:tgtEl>
+                                          <p:spTgt spid="3">
+                                            <p:txEl>
+                                              <p:pRg st="6" end="6"/>
+                                            </p:txEl>
+                                          </p:spTgt>
+                                        </p:tgtEl>
+                                        <p:attrNameLst>
+                                          <p:attrName>style.visibility</p:attrName>
+                                        </p:attrNameLst>
+                                      </p:cBhvr>
+                                      <p:to>
+                                        <p:strVal val="visible"/>
+                                      </p:to>
+                                    </p:set>
+                                    <p:anim calcmode="lin" valueType="num">
+                                      <p:cBhvr additive="base">
+                                        <p:cTn id="55" dur="500" fill="hold"/>
+                                        <p:tgtEl>
+                                          <p:spTgt spid="3">
+                                            <p:txEl>
+                                              <p:pRg st="6" end="6"/>
+                                            </p:txEl>
+                                          </p:spTgt>
+                                        </p:tgtEl>
+                                        <p:attrNameLst>
+                                          <p:attrName>ppt_x</p:attrName>
+                                        </p:attrNameLst>
+                                      </p:cBhvr>
+                                      <p:tavLst>
+                                        <p:tav tm="0">
+                                          <p:val>
+                                            <p:strVal val="#ppt_x"/>
+                                          </p:val>
+                                        </p:tav>
+                                        <p:tav tm="100000">
+                                          <p:val>
+                                            <p:strVal val="#ppt_x"/>
+                                          </p:val>
+                                        </p:tav>
+                                      </p:tavLst>
+                                    </p:anim>
+                                    <p:anim calcmode="lin" valueType="num">
+                                      <p:cBhvr additive="base">
+                                        <p:cTn id="56" dur="500" fill="hold"/>
+                                        <p:tgtEl>
+                                          <p:spTgt spid="3">
+                                            <p:txEl>
+                                              <p:pRg st="6" end="6"/>
+                                            </p:txEl>
+                                          </p:spTgt>
+                                        </p:tgtEl>
+                                        <p:attrNameLst>
+                                          <p:attrName>ppt_y</p:attrName>
+                                        </p:attrNameLst>
+                                      </p:cBhvr>
+                                      <p:tavLst>
+                                        <p:tav tm="0">
+                                          <p:val>
+                                            <p:strVal val="1+#ppt_h/2"/>
+                                          </p:val>
+                                        </p:tav>
+                                        <p:tav tm="100000">
+                                          <p:val>
+                                            <p:strVal val="#ppt_y"/>
+                                          </p:val>
+                                        </p:tav>
+                                      </p:tavLst>
+                                    </p:anim>
+                                  </p:childTnLst>
+                                </p:cTn>
+                              </p:par>
+                            </p:childTnLst>
+                          </p:cTn>
+                        </p:par>
+                      </p:childTnLst>
+                    </p:cTn>
+                  </p:par>
                 </p:childTnLst>
               </p:cTn>
               <p:prevCondLst>
@@ -15129,7 +17489,7 @@
           <a:p>
             <a:r>
               <a:rPr lang="en-US" b="1" dirty="0">
-                <a:latin typeface="Cody" pitchFamily="2" charset="0"/>
+                <a:latin typeface="Comic Sans MS" panose="030F0702030302020204" pitchFamily="66" charset="0"/>
                 <a:ea typeface="+mn-ea"/>
                 <a:cs typeface="MV Boli" panose="02000500030200090000" pitchFamily="2" charset="0"/>
               </a:rPr>
@@ -15137,14 +17497,14 @@
             </a:r>
             <a:r>
               <a:rPr lang="en-US" b="1" dirty="0" err="1">
-                <a:latin typeface="Cody" pitchFamily="2" charset="0"/>
+                <a:latin typeface="Comic Sans MS" panose="030F0702030302020204" pitchFamily="66" charset="0"/>
                 <a:ea typeface="+mn-ea"/>
                 <a:cs typeface="MV Boli" panose="02000500030200090000" pitchFamily="2" charset="0"/>
               </a:rPr>
               <a:t>gRPC</a:t>
             </a:r>
             <a:endParaRPr lang="en-US" b="1" dirty="0">
-              <a:latin typeface="Cody" pitchFamily="2" charset="0"/>
+              <a:latin typeface="Comic Sans MS" panose="030F0702030302020204" pitchFamily="66" charset="0"/>
               <a:ea typeface="+mn-ea"/>
               <a:cs typeface="MV Boli" panose="02000500030200090000" pitchFamily="2" charset="0"/>
             </a:endParaRPr>
@@ -16825,7 +19185,7 @@
           <a:p>
             <a:r>
               <a:rPr lang="en-US" b="1" dirty="0">
-                <a:latin typeface="Cody" pitchFamily="2" charset="0"/>
+                <a:latin typeface="Comic Sans MS" panose="030F0702030302020204" pitchFamily="66" charset="0"/>
                 <a:ea typeface="+mn-ea"/>
                 <a:cs typeface="MV Boli" panose="02000500030200090000" pitchFamily="2" charset="0"/>
               </a:rPr>
@@ -16833,14 +19193,14 @@
             </a:r>
             <a:r>
               <a:rPr lang="en-US" b="1" dirty="0" err="1">
-                <a:latin typeface="Cody" pitchFamily="2" charset="0"/>
+                <a:latin typeface="Comic Sans MS" panose="030F0702030302020204" pitchFamily="66" charset="0"/>
                 <a:ea typeface="+mn-ea"/>
                 <a:cs typeface="MV Boli" panose="02000500030200090000" pitchFamily="2" charset="0"/>
               </a:rPr>
               <a:t>gRPC</a:t>
             </a:r>
             <a:endParaRPr lang="en-US" b="1" dirty="0">
-              <a:latin typeface="Cody" pitchFamily="2" charset="0"/>
+              <a:latin typeface="Comic Sans MS" panose="030F0702030302020204" pitchFamily="66" charset="0"/>
               <a:ea typeface="+mn-ea"/>
               <a:cs typeface="MV Boli" panose="02000500030200090000" pitchFamily="2" charset="0"/>
             </a:endParaRPr>
@@ -19700,7 +22060,7 @@
           <a:p>
             <a:r>
               <a:rPr lang="en-US" b="1" dirty="0">
-                <a:latin typeface="Cody" pitchFamily="2" charset="0"/>
+                <a:latin typeface="Comic Sans MS" panose="030F0702030302020204" pitchFamily="66" charset="0"/>
                 <a:ea typeface="+mn-ea"/>
                 <a:cs typeface="MV Boli" panose="02000500030200090000" pitchFamily="2" charset="0"/>
               </a:rPr>
@@ -19708,14 +22068,14 @@
             </a:r>
             <a:r>
               <a:rPr lang="en-US" b="1" dirty="0" err="1">
-                <a:latin typeface="Cody" pitchFamily="2" charset="0"/>
+                <a:latin typeface="Comic Sans MS" panose="030F0702030302020204" pitchFamily="66" charset="0"/>
                 <a:ea typeface="+mn-ea"/>
                 <a:cs typeface="MV Boli" panose="02000500030200090000" pitchFamily="2" charset="0"/>
               </a:rPr>
               <a:t>gRPC</a:t>
             </a:r>
             <a:endParaRPr lang="en-US" b="1" dirty="0">
-              <a:latin typeface="Cody" pitchFamily="2" charset="0"/>
+              <a:latin typeface="Comic Sans MS" panose="030F0702030302020204" pitchFamily="66" charset="0"/>
               <a:ea typeface="+mn-ea"/>
               <a:cs typeface="MV Boli" panose="02000500030200090000" pitchFamily="2" charset="0"/>
             </a:endParaRPr>
@@ -24303,7 +26663,7 @@
           <a:p>
             <a:r>
               <a:rPr lang="en-US" b="1" dirty="0">
-                <a:latin typeface="Cody" pitchFamily="2" charset="0"/>
+                <a:latin typeface="Comic Sans MS" panose="030F0702030302020204" pitchFamily="66" charset="0"/>
                 <a:ea typeface="+mn-ea"/>
                 <a:cs typeface="MV Boli" panose="02000500030200090000" pitchFamily="2" charset="0"/>
               </a:rPr>
@@ -24311,14 +26671,14 @@
             </a:r>
             <a:r>
               <a:rPr lang="en-US" b="1" dirty="0" err="1">
-                <a:latin typeface="Cody" pitchFamily="2" charset="0"/>
+                <a:latin typeface="Comic Sans MS" panose="030F0702030302020204" pitchFamily="66" charset="0"/>
                 <a:ea typeface="+mn-ea"/>
                 <a:cs typeface="MV Boli" panose="02000500030200090000" pitchFamily="2" charset="0"/>
               </a:rPr>
               <a:t>gRPC</a:t>
             </a:r>
             <a:endParaRPr lang="en-US" b="1" dirty="0">
-              <a:latin typeface="Cody" pitchFamily="2" charset="0"/>
+              <a:latin typeface="Comic Sans MS" panose="030F0702030302020204" pitchFamily="66" charset="0"/>
               <a:ea typeface="+mn-ea"/>
               <a:cs typeface="MV Boli" panose="02000500030200090000" pitchFamily="2" charset="0"/>
             </a:endParaRPr>
@@ -24404,7 +26764,7 @@
           <a:p>
             <a:r>
               <a:rPr lang="en-US" b="1" dirty="0">
-                <a:latin typeface="Cody" pitchFamily="2" charset="0"/>
+                <a:latin typeface="Comic Sans MS" panose="030F0702030302020204" pitchFamily="66" charset="0"/>
                 <a:ea typeface="+mn-ea"/>
                 <a:cs typeface="MV Boli" panose="02000500030200090000" pitchFamily="2" charset="0"/>
               </a:rPr>
@@ -24412,7 +26772,7 @@
             </a:r>
             <a:r>
               <a:rPr lang="en-US" b="1" dirty="0" err="1">
-                <a:latin typeface="Cody" pitchFamily="2" charset="0"/>
+                <a:latin typeface="Comic Sans MS" panose="030F0702030302020204" pitchFamily="66" charset="0"/>
                 <a:ea typeface="+mn-ea"/>
                 <a:cs typeface="MV Boli" panose="02000500030200090000" pitchFamily="2" charset="0"/>
               </a:rPr>
@@ -24420,7 +26780,7 @@
             </a:r>
             <a:r>
               <a:rPr lang="en-US" b="1" dirty="0">
-                <a:latin typeface="Cody" pitchFamily="2" charset="0"/>
+                <a:latin typeface="Comic Sans MS" panose="030F0702030302020204" pitchFamily="66" charset="0"/>
                 <a:ea typeface="+mn-ea"/>
                 <a:cs typeface="MV Boli" panose="02000500030200090000" pitchFamily="2" charset="0"/>
               </a:rPr>
@@ -25327,7 +27687,7 @@
           <a:p>
             <a:r>
               <a:rPr lang="en-US" b="1" dirty="0">
-                <a:latin typeface="Cody" pitchFamily="2" charset="0"/>
+                <a:latin typeface="Comic Sans MS" panose="030F0702030302020204" pitchFamily="66" charset="0"/>
                 <a:ea typeface="+mn-ea"/>
                 <a:cs typeface="MV Boli" panose="02000500030200090000" pitchFamily="2" charset="0"/>
               </a:rPr>
@@ -26758,7 +29118,7 @@
           <a:p>
             <a:r>
               <a:rPr lang="en-US" b="1" dirty="0">
-                <a:latin typeface="Cody" pitchFamily="2" charset="0"/>
+                <a:latin typeface="Comic Sans MS" panose="030F0702030302020204" pitchFamily="66" charset="0"/>
                 <a:ea typeface="+mn-ea"/>
                 <a:cs typeface="MV Boli" panose="02000500030200090000" pitchFamily="2" charset="0"/>
               </a:rPr>

</xml_diff>